<commit_message>
Replace Apresentação - Arcabouço do AG.pptx
</commit_message>
<xml_diff>
--- a/Apresentação - Arcabouço do AG.pptx
+++ b/Apresentação - Arcabouço do AG.pptx
@@ -194,10 +194,9 @@
           </a:lstStyle>
           <a:p>
             <a:r>
-              <a:rPr lang="pt-BR" smtClean="0"/>
+              <a:rPr lang="pt-BR"/>
               <a:t>Clique para editar o título mestre</a:t>
             </a:r>
-            <a:endParaRPr lang="pt-BR"/>
           </a:p>
         </p:txBody>
       </p:sp>
@@ -259,10 +258,9 @@
           </a:lstStyle>
           <a:p>
             <a:r>
-              <a:rPr lang="pt-BR" smtClean="0"/>
+              <a:rPr lang="pt-BR"/>
               <a:t>Clique para editar o estilo do subtítulo mestre</a:t>
             </a:r>
-            <a:endParaRPr lang="pt-BR"/>
           </a:p>
         </p:txBody>
       </p:sp>
@@ -283,7 +281,7 @@
           <a:p>
             <a:fld id="{DC796E63-57DB-4963-86F3-0D7E31FCE513}" type="datetimeFigureOut">
               <a:rPr lang="pt-BR" smtClean="0"/>
-              <a:t>31/05/2017</a:t>
+              <a:t>18/04/2020</a:t>
             </a:fld>
             <a:endParaRPr lang="pt-BR"/>
           </a:p>
@@ -372,10 +370,9 @@
           <a:lstStyle/>
           <a:p>
             <a:r>
-              <a:rPr lang="pt-BR" smtClean="0"/>
+              <a:rPr lang="pt-BR"/>
               <a:t>Clique para editar o título mestre</a:t>
             </a:r>
-            <a:endParaRPr lang="pt-BR"/>
           </a:p>
         </p:txBody>
       </p:sp>
@@ -396,38 +393,37 @@
           <a:p>
             <a:pPr lvl="0"/>
             <a:r>
-              <a:rPr lang="pt-BR" smtClean="0"/>
+              <a:rPr lang="pt-BR"/>
               <a:t>Clique para editar o texto mestre</a:t>
             </a:r>
           </a:p>
           <a:p>
             <a:pPr lvl="1"/>
             <a:r>
-              <a:rPr lang="pt-BR" smtClean="0"/>
+              <a:rPr lang="pt-BR"/>
               <a:t>Segundo nível</a:t>
             </a:r>
           </a:p>
           <a:p>
             <a:pPr lvl="2"/>
             <a:r>
-              <a:rPr lang="pt-BR" smtClean="0"/>
+              <a:rPr lang="pt-BR"/>
               <a:t>Terceiro nível</a:t>
             </a:r>
           </a:p>
           <a:p>
             <a:pPr lvl="3"/>
             <a:r>
-              <a:rPr lang="pt-BR" smtClean="0"/>
+              <a:rPr lang="pt-BR"/>
               <a:t>Quarto nível</a:t>
             </a:r>
           </a:p>
           <a:p>
             <a:pPr lvl="4"/>
             <a:r>
-              <a:rPr lang="pt-BR" smtClean="0"/>
+              <a:rPr lang="pt-BR"/>
               <a:t>Quinto nível</a:t>
             </a:r>
-            <a:endParaRPr lang="pt-BR"/>
           </a:p>
         </p:txBody>
       </p:sp>
@@ -448,7 +444,7 @@
           <a:p>
             <a:fld id="{DC796E63-57DB-4963-86F3-0D7E31FCE513}" type="datetimeFigureOut">
               <a:rPr lang="pt-BR" smtClean="0"/>
-              <a:t>31/05/2017</a:t>
+              <a:t>18/04/2020</a:t>
             </a:fld>
             <a:endParaRPr lang="pt-BR"/>
           </a:p>
@@ -542,10 +538,9 @@
           <a:lstStyle/>
           <a:p>
             <a:r>
-              <a:rPr lang="pt-BR" smtClean="0"/>
+              <a:rPr lang="pt-BR"/>
               <a:t>Clique para editar o título mestre</a:t>
             </a:r>
-            <a:endParaRPr lang="pt-BR"/>
           </a:p>
         </p:txBody>
       </p:sp>
@@ -571,38 +566,37 @@
           <a:p>
             <a:pPr lvl="0"/>
             <a:r>
-              <a:rPr lang="pt-BR" smtClean="0"/>
+              <a:rPr lang="pt-BR"/>
               <a:t>Clique para editar o texto mestre</a:t>
             </a:r>
           </a:p>
           <a:p>
             <a:pPr lvl="1"/>
             <a:r>
-              <a:rPr lang="pt-BR" smtClean="0"/>
+              <a:rPr lang="pt-BR"/>
               <a:t>Segundo nível</a:t>
             </a:r>
           </a:p>
           <a:p>
             <a:pPr lvl="2"/>
             <a:r>
-              <a:rPr lang="pt-BR" smtClean="0"/>
+              <a:rPr lang="pt-BR"/>
               <a:t>Terceiro nível</a:t>
             </a:r>
           </a:p>
           <a:p>
             <a:pPr lvl="3"/>
             <a:r>
-              <a:rPr lang="pt-BR" smtClean="0"/>
+              <a:rPr lang="pt-BR"/>
               <a:t>Quarto nível</a:t>
             </a:r>
           </a:p>
           <a:p>
             <a:pPr lvl="4"/>
             <a:r>
-              <a:rPr lang="pt-BR" smtClean="0"/>
+              <a:rPr lang="pt-BR"/>
               <a:t>Quinto nível</a:t>
             </a:r>
-            <a:endParaRPr lang="pt-BR"/>
           </a:p>
         </p:txBody>
       </p:sp>
@@ -623,7 +617,7 @@
           <a:p>
             <a:fld id="{DC796E63-57DB-4963-86F3-0D7E31FCE513}" type="datetimeFigureOut">
               <a:rPr lang="pt-BR" smtClean="0"/>
-              <a:t>31/05/2017</a:t>
+              <a:t>18/04/2020</a:t>
             </a:fld>
             <a:endParaRPr lang="pt-BR"/>
           </a:p>
@@ -712,10 +706,9 @@
           <a:lstStyle/>
           <a:p>
             <a:r>
-              <a:rPr lang="pt-BR" smtClean="0"/>
+              <a:rPr lang="pt-BR"/>
               <a:t>Clique para editar o título mestre</a:t>
             </a:r>
-            <a:endParaRPr lang="pt-BR"/>
           </a:p>
         </p:txBody>
       </p:sp>
@@ -736,38 +729,37 @@
           <a:p>
             <a:pPr lvl="0"/>
             <a:r>
-              <a:rPr lang="pt-BR" smtClean="0"/>
+              <a:rPr lang="pt-BR"/>
               <a:t>Clique para editar o texto mestre</a:t>
             </a:r>
           </a:p>
           <a:p>
             <a:pPr lvl="1"/>
             <a:r>
-              <a:rPr lang="pt-BR" smtClean="0"/>
+              <a:rPr lang="pt-BR"/>
               <a:t>Segundo nível</a:t>
             </a:r>
           </a:p>
           <a:p>
             <a:pPr lvl="2"/>
             <a:r>
-              <a:rPr lang="pt-BR" smtClean="0"/>
+              <a:rPr lang="pt-BR"/>
               <a:t>Terceiro nível</a:t>
             </a:r>
           </a:p>
           <a:p>
             <a:pPr lvl="3"/>
             <a:r>
-              <a:rPr lang="pt-BR" smtClean="0"/>
+              <a:rPr lang="pt-BR"/>
               <a:t>Quarto nível</a:t>
             </a:r>
           </a:p>
           <a:p>
             <a:pPr lvl="4"/>
             <a:r>
-              <a:rPr lang="pt-BR" smtClean="0"/>
+              <a:rPr lang="pt-BR"/>
               <a:t>Quinto nível</a:t>
             </a:r>
-            <a:endParaRPr lang="pt-BR"/>
           </a:p>
         </p:txBody>
       </p:sp>
@@ -788,7 +780,7 @@
           <a:p>
             <a:fld id="{DC796E63-57DB-4963-86F3-0D7E31FCE513}" type="datetimeFigureOut">
               <a:rPr lang="pt-BR" smtClean="0"/>
-              <a:t>31/05/2017</a:t>
+              <a:t>18/04/2020</a:t>
             </a:fld>
             <a:endParaRPr lang="pt-BR"/>
           </a:p>
@@ -886,10 +878,9 @@
           </a:lstStyle>
           <a:p>
             <a:r>
-              <a:rPr lang="pt-BR" smtClean="0"/>
+              <a:rPr lang="pt-BR"/>
               <a:t>Clique para editar o título mestre</a:t>
             </a:r>
-            <a:endParaRPr lang="pt-BR"/>
           </a:p>
         </p:txBody>
       </p:sp>
@@ -1006,7 +997,7 @@
           <a:p>
             <a:pPr lvl="0"/>
             <a:r>
-              <a:rPr lang="pt-BR" smtClean="0"/>
+              <a:rPr lang="pt-BR"/>
               <a:t>Clique para editar o texto mestre</a:t>
             </a:r>
           </a:p>
@@ -1029,7 +1020,7 @@
           <a:p>
             <a:fld id="{DC796E63-57DB-4963-86F3-0D7E31FCE513}" type="datetimeFigureOut">
               <a:rPr lang="pt-BR" smtClean="0"/>
-              <a:t>31/05/2017</a:t>
+              <a:t>18/04/2020</a:t>
             </a:fld>
             <a:endParaRPr lang="pt-BR"/>
           </a:p>
@@ -1118,10 +1109,9 @@
           <a:lstStyle/>
           <a:p>
             <a:r>
-              <a:rPr lang="pt-BR" smtClean="0"/>
+              <a:rPr lang="pt-BR"/>
               <a:t>Clique para editar o título mestre</a:t>
             </a:r>
-            <a:endParaRPr lang="pt-BR"/>
           </a:p>
         </p:txBody>
       </p:sp>
@@ -1147,38 +1137,37 @@
           <a:p>
             <a:pPr lvl="0"/>
             <a:r>
-              <a:rPr lang="pt-BR" smtClean="0"/>
+              <a:rPr lang="pt-BR"/>
               <a:t>Clique para editar o texto mestre</a:t>
             </a:r>
           </a:p>
           <a:p>
             <a:pPr lvl="1"/>
             <a:r>
-              <a:rPr lang="pt-BR" smtClean="0"/>
+              <a:rPr lang="pt-BR"/>
               <a:t>Segundo nível</a:t>
             </a:r>
           </a:p>
           <a:p>
             <a:pPr lvl="2"/>
             <a:r>
-              <a:rPr lang="pt-BR" smtClean="0"/>
+              <a:rPr lang="pt-BR"/>
               <a:t>Terceiro nível</a:t>
             </a:r>
           </a:p>
           <a:p>
             <a:pPr lvl="3"/>
             <a:r>
-              <a:rPr lang="pt-BR" smtClean="0"/>
+              <a:rPr lang="pt-BR"/>
               <a:t>Quarto nível</a:t>
             </a:r>
           </a:p>
           <a:p>
             <a:pPr lvl="4"/>
             <a:r>
-              <a:rPr lang="pt-BR" smtClean="0"/>
+              <a:rPr lang="pt-BR"/>
               <a:t>Quinto nível</a:t>
             </a:r>
-            <a:endParaRPr lang="pt-BR"/>
           </a:p>
         </p:txBody>
       </p:sp>
@@ -1204,38 +1193,37 @@
           <a:p>
             <a:pPr lvl="0"/>
             <a:r>
-              <a:rPr lang="pt-BR" smtClean="0"/>
+              <a:rPr lang="pt-BR"/>
               <a:t>Clique para editar o texto mestre</a:t>
             </a:r>
           </a:p>
           <a:p>
             <a:pPr lvl="1"/>
             <a:r>
-              <a:rPr lang="pt-BR" smtClean="0"/>
+              <a:rPr lang="pt-BR"/>
               <a:t>Segundo nível</a:t>
             </a:r>
           </a:p>
           <a:p>
             <a:pPr lvl="2"/>
             <a:r>
-              <a:rPr lang="pt-BR" smtClean="0"/>
+              <a:rPr lang="pt-BR"/>
               <a:t>Terceiro nível</a:t>
             </a:r>
           </a:p>
           <a:p>
             <a:pPr lvl="3"/>
             <a:r>
-              <a:rPr lang="pt-BR" smtClean="0"/>
+              <a:rPr lang="pt-BR"/>
               <a:t>Quarto nível</a:t>
             </a:r>
           </a:p>
           <a:p>
             <a:pPr lvl="4"/>
             <a:r>
-              <a:rPr lang="pt-BR" smtClean="0"/>
+              <a:rPr lang="pt-BR"/>
               <a:t>Quinto nível</a:t>
             </a:r>
-            <a:endParaRPr lang="pt-BR"/>
           </a:p>
         </p:txBody>
       </p:sp>
@@ -1256,7 +1244,7 @@
           <a:p>
             <a:fld id="{DC796E63-57DB-4963-86F3-0D7E31FCE513}" type="datetimeFigureOut">
               <a:rPr lang="pt-BR" smtClean="0"/>
-              <a:t>31/05/2017</a:t>
+              <a:t>18/04/2020</a:t>
             </a:fld>
             <a:endParaRPr lang="pt-BR"/>
           </a:p>
@@ -1350,10 +1338,9 @@
           <a:lstStyle/>
           <a:p>
             <a:r>
-              <a:rPr lang="pt-BR" smtClean="0"/>
+              <a:rPr lang="pt-BR"/>
               <a:t>Clique para editar o título mestre</a:t>
             </a:r>
-            <a:endParaRPr lang="pt-BR"/>
           </a:p>
         </p:txBody>
       </p:sp>
@@ -1416,7 +1403,7 @@
           <a:p>
             <a:pPr lvl="0"/>
             <a:r>
-              <a:rPr lang="pt-BR" smtClean="0"/>
+              <a:rPr lang="pt-BR"/>
               <a:t>Clique para editar o texto mestre</a:t>
             </a:r>
           </a:p>
@@ -1444,38 +1431,37 @@
           <a:p>
             <a:pPr lvl="0"/>
             <a:r>
-              <a:rPr lang="pt-BR" smtClean="0"/>
+              <a:rPr lang="pt-BR"/>
               <a:t>Clique para editar o texto mestre</a:t>
             </a:r>
           </a:p>
           <a:p>
             <a:pPr lvl="1"/>
             <a:r>
-              <a:rPr lang="pt-BR" smtClean="0"/>
+              <a:rPr lang="pt-BR"/>
               <a:t>Segundo nível</a:t>
             </a:r>
           </a:p>
           <a:p>
             <a:pPr lvl="2"/>
             <a:r>
-              <a:rPr lang="pt-BR" smtClean="0"/>
+              <a:rPr lang="pt-BR"/>
               <a:t>Terceiro nível</a:t>
             </a:r>
           </a:p>
           <a:p>
             <a:pPr lvl="3"/>
             <a:r>
-              <a:rPr lang="pt-BR" smtClean="0"/>
+              <a:rPr lang="pt-BR"/>
               <a:t>Quarto nível</a:t>
             </a:r>
           </a:p>
           <a:p>
             <a:pPr lvl="4"/>
             <a:r>
-              <a:rPr lang="pt-BR" smtClean="0"/>
+              <a:rPr lang="pt-BR"/>
               <a:t>Quinto nível</a:t>
             </a:r>
-            <a:endParaRPr lang="pt-BR"/>
           </a:p>
         </p:txBody>
       </p:sp>
@@ -1538,7 +1524,7 @@
           <a:p>
             <a:pPr lvl="0"/>
             <a:r>
-              <a:rPr lang="pt-BR" smtClean="0"/>
+              <a:rPr lang="pt-BR"/>
               <a:t>Clique para editar o texto mestre</a:t>
             </a:r>
           </a:p>
@@ -1566,38 +1552,37 @@
           <a:p>
             <a:pPr lvl="0"/>
             <a:r>
-              <a:rPr lang="pt-BR" smtClean="0"/>
+              <a:rPr lang="pt-BR"/>
               <a:t>Clique para editar o texto mestre</a:t>
             </a:r>
           </a:p>
           <a:p>
             <a:pPr lvl="1"/>
             <a:r>
-              <a:rPr lang="pt-BR" smtClean="0"/>
+              <a:rPr lang="pt-BR"/>
               <a:t>Segundo nível</a:t>
             </a:r>
           </a:p>
           <a:p>
             <a:pPr lvl="2"/>
             <a:r>
-              <a:rPr lang="pt-BR" smtClean="0"/>
+              <a:rPr lang="pt-BR"/>
               <a:t>Terceiro nível</a:t>
             </a:r>
           </a:p>
           <a:p>
             <a:pPr lvl="3"/>
             <a:r>
-              <a:rPr lang="pt-BR" smtClean="0"/>
+              <a:rPr lang="pt-BR"/>
               <a:t>Quarto nível</a:t>
             </a:r>
           </a:p>
           <a:p>
             <a:pPr lvl="4"/>
             <a:r>
-              <a:rPr lang="pt-BR" smtClean="0"/>
+              <a:rPr lang="pt-BR"/>
               <a:t>Quinto nível</a:t>
             </a:r>
-            <a:endParaRPr lang="pt-BR"/>
           </a:p>
         </p:txBody>
       </p:sp>
@@ -1618,7 +1603,7 @@
           <a:p>
             <a:fld id="{DC796E63-57DB-4963-86F3-0D7E31FCE513}" type="datetimeFigureOut">
               <a:rPr lang="pt-BR" smtClean="0"/>
-              <a:t>31/05/2017</a:t>
+              <a:t>18/04/2020</a:t>
             </a:fld>
             <a:endParaRPr lang="pt-BR"/>
           </a:p>
@@ -1707,10 +1692,9 @@
           <a:lstStyle/>
           <a:p>
             <a:r>
-              <a:rPr lang="pt-BR" smtClean="0"/>
+              <a:rPr lang="pt-BR"/>
               <a:t>Clique para editar o título mestre</a:t>
             </a:r>
-            <a:endParaRPr lang="pt-BR"/>
           </a:p>
         </p:txBody>
       </p:sp>
@@ -1731,7 +1715,7 @@
           <a:p>
             <a:fld id="{DC796E63-57DB-4963-86F3-0D7E31FCE513}" type="datetimeFigureOut">
               <a:rPr lang="pt-BR" smtClean="0"/>
-              <a:t>31/05/2017</a:t>
+              <a:t>18/04/2020</a:t>
             </a:fld>
             <a:endParaRPr lang="pt-BR"/>
           </a:p>
@@ -1821,7 +1805,7 @@
           <a:p>
             <a:fld id="{DC796E63-57DB-4963-86F3-0D7E31FCE513}" type="datetimeFigureOut">
               <a:rPr lang="pt-BR" smtClean="0"/>
-              <a:t>31/05/2017</a:t>
+              <a:t>18/04/2020</a:t>
             </a:fld>
             <a:endParaRPr lang="pt-BR"/>
           </a:p>
@@ -1919,10 +1903,9 @@
           </a:lstStyle>
           <a:p>
             <a:r>
-              <a:rPr lang="pt-BR" smtClean="0"/>
+              <a:rPr lang="pt-BR"/>
               <a:t>Clique para editar o título mestre</a:t>
             </a:r>
-            <a:endParaRPr lang="pt-BR"/>
           </a:p>
         </p:txBody>
       </p:sp>
@@ -1976,38 +1959,37 @@
           <a:p>
             <a:pPr lvl="0"/>
             <a:r>
-              <a:rPr lang="pt-BR" smtClean="0"/>
+              <a:rPr lang="pt-BR"/>
               <a:t>Clique para editar o texto mestre</a:t>
             </a:r>
           </a:p>
           <a:p>
             <a:pPr lvl="1"/>
             <a:r>
-              <a:rPr lang="pt-BR" smtClean="0"/>
+              <a:rPr lang="pt-BR"/>
               <a:t>Segundo nível</a:t>
             </a:r>
           </a:p>
           <a:p>
             <a:pPr lvl="2"/>
             <a:r>
-              <a:rPr lang="pt-BR" smtClean="0"/>
+              <a:rPr lang="pt-BR"/>
               <a:t>Terceiro nível</a:t>
             </a:r>
           </a:p>
           <a:p>
             <a:pPr lvl="3"/>
             <a:r>
-              <a:rPr lang="pt-BR" smtClean="0"/>
+              <a:rPr lang="pt-BR"/>
               <a:t>Quarto nível</a:t>
             </a:r>
           </a:p>
           <a:p>
             <a:pPr lvl="4"/>
             <a:r>
-              <a:rPr lang="pt-BR" smtClean="0"/>
+              <a:rPr lang="pt-BR"/>
               <a:t>Quinto nível</a:t>
             </a:r>
-            <a:endParaRPr lang="pt-BR"/>
           </a:p>
         </p:txBody>
       </p:sp>
@@ -2070,7 +2052,7 @@
           <a:p>
             <a:pPr lvl="0"/>
             <a:r>
-              <a:rPr lang="pt-BR" smtClean="0"/>
+              <a:rPr lang="pt-BR"/>
               <a:t>Clique para editar o texto mestre</a:t>
             </a:r>
           </a:p>
@@ -2093,7 +2075,7 @@
           <a:p>
             <a:fld id="{DC796E63-57DB-4963-86F3-0D7E31FCE513}" type="datetimeFigureOut">
               <a:rPr lang="pt-BR" smtClean="0"/>
-              <a:t>31/05/2017</a:t>
+              <a:t>18/04/2020</a:t>
             </a:fld>
             <a:endParaRPr lang="pt-BR"/>
           </a:p>
@@ -2191,10 +2173,9 @@
           </a:lstStyle>
           <a:p>
             <a:r>
-              <a:rPr lang="pt-BR" smtClean="0"/>
+              <a:rPr lang="pt-BR"/>
               <a:t>Clique para editar o título mestre</a:t>
             </a:r>
-            <a:endParaRPr lang="pt-BR"/>
           </a:p>
         </p:txBody>
       </p:sp>
@@ -2318,7 +2299,7 @@
           <a:p>
             <a:pPr lvl="0"/>
             <a:r>
-              <a:rPr lang="pt-BR" smtClean="0"/>
+              <a:rPr lang="pt-BR"/>
               <a:t>Clique para editar o texto mestre</a:t>
             </a:r>
           </a:p>
@@ -2341,7 +2322,7 @@
           <a:p>
             <a:fld id="{DC796E63-57DB-4963-86F3-0D7E31FCE513}" type="datetimeFigureOut">
               <a:rPr lang="pt-BR" smtClean="0"/>
-              <a:t>31/05/2017</a:t>
+              <a:t>18/04/2020</a:t>
             </a:fld>
             <a:endParaRPr lang="pt-BR"/>
           </a:p>
@@ -2445,10 +2426,9 @@
           <a:lstStyle/>
           <a:p>
             <a:r>
-              <a:rPr lang="pt-BR" smtClean="0"/>
+              <a:rPr lang="pt-BR"/>
               <a:t>Clique para editar o título mestre</a:t>
             </a:r>
-            <a:endParaRPr lang="pt-BR"/>
           </a:p>
         </p:txBody>
       </p:sp>
@@ -2479,38 +2459,37 @@
           <a:p>
             <a:pPr lvl="0"/>
             <a:r>
-              <a:rPr lang="pt-BR" smtClean="0"/>
+              <a:rPr lang="pt-BR"/>
               <a:t>Clique para editar o texto mestre</a:t>
             </a:r>
           </a:p>
           <a:p>
             <a:pPr lvl="1"/>
             <a:r>
-              <a:rPr lang="pt-BR" smtClean="0"/>
+              <a:rPr lang="pt-BR"/>
               <a:t>Segundo nível</a:t>
             </a:r>
           </a:p>
           <a:p>
             <a:pPr lvl="2"/>
             <a:r>
-              <a:rPr lang="pt-BR" smtClean="0"/>
+              <a:rPr lang="pt-BR"/>
               <a:t>Terceiro nível</a:t>
             </a:r>
           </a:p>
           <a:p>
             <a:pPr lvl="3"/>
             <a:r>
-              <a:rPr lang="pt-BR" smtClean="0"/>
+              <a:rPr lang="pt-BR"/>
               <a:t>Quarto nível</a:t>
             </a:r>
           </a:p>
           <a:p>
             <a:pPr lvl="4"/>
             <a:r>
-              <a:rPr lang="pt-BR" smtClean="0"/>
+              <a:rPr lang="pt-BR"/>
               <a:t>Quinto nível</a:t>
             </a:r>
-            <a:endParaRPr lang="pt-BR"/>
           </a:p>
         </p:txBody>
       </p:sp>
@@ -2549,7 +2528,7 @@
           <a:p>
             <a:fld id="{DC796E63-57DB-4963-86F3-0D7E31FCE513}" type="datetimeFigureOut">
               <a:rPr lang="pt-BR" smtClean="0"/>
-              <a:t>31/05/2017</a:t>
+              <a:t>18/04/2020</a:t>
             </a:fld>
             <a:endParaRPr lang="pt-BR"/>
           </a:p>
@@ -2972,33 +2951,29 @@
           <a:lstStyle/>
           <a:p>
             <a:r>
-              <a:rPr lang="pt-BR" dirty="0" smtClean="0"/>
+              <a:rPr lang="pt-BR" dirty="0"/>
               <a:t>Computação Evolucionária</a:t>
             </a:r>
             <a:br>
-              <a:rPr lang="pt-BR" dirty="0" smtClean="0"/>
+              <a:rPr lang="pt-BR" dirty="0"/>
             </a:br>
-            <a:r>
-              <a:rPr lang="pt-BR" dirty="0" smtClean="0"/>
-              <a:t/>
-            </a:r>
             <a:br>
-              <a:rPr lang="pt-BR" dirty="0" smtClean="0"/>
+              <a:rPr lang="pt-BR" dirty="0"/>
             </a:br>
             <a:r>
-              <a:rPr lang="pt-BR" dirty="0" smtClean="0"/>
+              <a:rPr lang="pt-BR" dirty="0"/>
               <a:t>Arcabouço do AG e Comparação ao </a:t>
             </a:r>
             <a:r>
-              <a:rPr lang="pt-BR" dirty="0" err="1" smtClean="0"/>
+              <a:rPr lang="pt-BR" dirty="0" err="1"/>
               <a:t>Random</a:t>
             </a:r>
             <a:r>
-              <a:rPr lang="pt-BR" dirty="0" smtClean="0"/>
+              <a:rPr lang="pt-BR" dirty="0"/>
               <a:t> </a:t>
             </a:r>
             <a:r>
-              <a:rPr lang="pt-BR" dirty="0" err="1" smtClean="0"/>
+              <a:rPr lang="pt-BR" dirty="0" err="1"/>
               <a:t>Walk</a:t>
             </a:r>
             <a:endParaRPr lang="pt-BR" dirty="0"/>
@@ -3025,12 +3000,12 @@
           <a:bodyPr/>
           <a:lstStyle/>
           <a:p>
-            <a:endParaRPr lang="pt-BR" dirty="0" smtClean="0"/>
-          </a:p>
-          <a:p>
-            <a:r>
-              <a:rPr lang="pt-BR" dirty="0" smtClean="0"/>
-              <a:t>Alexandre Farias Baía</a:t>
+            <a:endParaRPr lang="pt-BR" dirty="0"/>
+          </a:p>
+          <a:p>
+            <a:r>
+              <a:rPr lang="pt-BR"/>
+              <a:t>Alexandre Farias</a:t>
             </a:r>
             <a:endParaRPr lang="pt-BR" dirty="0"/>
           </a:p>
@@ -3041,13 +3016,6 @@
   <p:clrMapOvr>
     <a:masterClrMapping/>
   </p:clrMapOvr>
-  <p:timing>
-    <p:tnLst>
-      <p:par>
-        <p:cTn id="1" dur="indefinite" restart="never" nodeType="tmRoot"/>
-      </p:par>
-    </p:tnLst>
-  </p:timing>
 </p:sld>
 </file>
 
@@ -3133,7 +3101,13 @@
                 <a:tableStyleId>{5C22544A-7EE6-4342-B048-85BDC9FD1C3A}</a:tableStyleId>
               </a:tblPr>
               <a:tblGrid>
-                <a:gridCol w="10515600"/>
+                <a:gridCol w="10515600">
+                  <a:extLst>
+                    <a:ext uri="{9D8B030D-6E8A-4147-A177-3AD203B41FA5}">
+                      <a16:colId xmlns:a16="http://schemas.microsoft.com/office/drawing/2014/main" val="20000"/>
+                    </a:ext>
+                  </a:extLst>
+                </a:gridCol>
               </a:tblGrid>
               <a:tr h="370840">
                 <a:tc>
@@ -3158,29 +3132,34 @@
                         <a:defRPr/>
                       </a:pPr>
                       <a:r>
-                        <a:rPr lang="pt-BR" dirty="0" smtClean="0"/>
+                        <a:rPr lang="pt-BR" dirty="0"/>
                         <a:t>Soluções Encontradas para 10 caracteres da Palavra Alvo (</a:t>
                       </a:r>
                       <a:r>
-                        <a:rPr lang="pt-BR" dirty="0" err="1" smtClean="0"/>
+                        <a:rPr lang="pt-BR" dirty="0" err="1"/>
                         <a:t>Random</a:t>
                       </a:r>
                       <a:r>
-                        <a:rPr lang="pt-BR" baseline="0" dirty="0" smtClean="0"/>
+                        <a:rPr lang="pt-BR" baseline="0" dirty="0"/>
                         <a:t> </a:t>
                       </a:r>
                       <a:r>
-                        <a:rPr lang="pt-BR" dirty="0" err="1" smtClean="0"/>
+                        <a:rPr lang="pt-BR" dirty="0" err="1"/>
                         <a:t>Walk</a:t>
                       </a:r>
                       <a:r>
-                        <a:rPr lang="pt-BR" dirty="0" smtClean="0"/>
+                        <a:rPr lang="pt-BR" dirty="0"/>
                         <a:t>, População 50)</a:t>
                       </a:r>
                     </a:p>
                   </a:txBody>
                   <a:tcPr/>
                 </a:tc>
+                <a:extLst>
+                  <a:ext uri="{0D108BD9-81ED-4DB2-BD59-A6C34878D82A}">
+                    <a16:rowId xmlns:a16="http://schemas.microsoft.com/office/drawing/2014/main" val="10000"/>
+                  </a:ext>
+                </a:extLst>
               </a:tr>
               <a:tr h="370840">
                 <a:tc>
@@ -3190,14 +3169,18 @@
                     <a:p>
                       <a:pPr algn="ctr"/>
                       <a:r>
-                        <a:rPr lang="pt-BR" dirty="0" smtClean="0"/>
+                        <a:rPr lang="pt-BR" dirty="0"/>
                         <a:t>52.732, 82.238, 52.591, 66.476, 106.637, 105.501, 75.594, 105.05, 52.558, 87.07</a:t>
                       </a:r>
-                      <a:endParaRPr lang="pt-BR" dirty="0"/>
-                    </a:p>
-                  </a:txBody>
-                  <a:tcPr/>
-                </a:tc>
+                    </a:p>
+                  </a:txBody>
+                  <a:tcPr/>
+                </a:tc>
+                <a:extLst>
+                  <a:ext uri="{0D108BD9-81ED-4DB2-BD59-A6C34878D82A}">
+                    <a16:rowId xmlns:a16="http://schemas.microsoft.com/office/drawing/2014/main" val="10001"/>
+                  </a:ext>
+                </a:extLst>
               </a:tr>
               <a:tr h="370840">
                 <a:tc>
@@ -3207,14 +3190,18 @@
                     <a:p>
                       <a:pPr algn="ctr"/>
                       <a:r>
-                        <a:rPr lang="pt-BR" dirty="0" smtClean="0"/>
+                        <a:rPr lang="pt-BR" dirty="0"/>
                         <a:t>57.301, 61.854, 51.889, 57.654, 117.893, 102.462, 79.39, 115.049, 52.776, 88.776</a:t>
                       </a:r>
-                      <a:endParaRPr lang="pt-BR" dirty="0"/>
-                    </a:p>
-                  </a:txBody>
-                  <a:tcPr/>
-                </a:tc>
+                    </a:p>
+                  </a:txBody>
+                  <a:tcPr/>
+                </a:tc>
+                <a:extLst>
+                  <a:ext uri="{0D108BD9-81ED-4DB2-BD59-A6C34878D82A}">
+                    <a16:rowId xmlns:a16="http://schemas.microsoft.com/office/drawing/2014/main" val="10002"/>
+                  </a:ext>
+                </a:extLst>
               </a:tr>
               <a:tr h="370840">
                 <a:tc>
@@ -3224,14 +3211,18 @@
                     <a:p>
                       <a:pPr algn="ctr"/>
                       <a:r>
-                        <a:rPr lang="pt-BR" dirty="0" smtClean="0"/>
+                        <a:rPr lang="pt-BR" dirty="0"/>
                         <a:t>52.486, 69.391, 55.91, 54.542, 97.037, 107.31, 82.451, 109.434, 61.402, 86.172</a:t>
                       </a:r>
-                      <a:endParaRPr lang="pt-BR" dirty="0"/>
-                    </a:p>
-                  </a:txBody>
-                  <a:tcPr/>
-                </a:tc>
+                    </a:p>
+                  </a:txBody>
+                  <a:tcPr/>
+                </a:tc>
+                <a:extLst>
+                  <a:ext uri="{0D108BD9-81ED-4DB2-BD59-A6C34878D82A}">
+                    <a16:rowId xmlns:a16="http://schemas.microsoft.com/office/drawing/2014/main" val="10003"/>
+                  </a:ext>
+                </a:extLst>
               </a:tr>
               <a:tr h="370840">
                 <a:tc>
@@ -3241,14 +3232,18 @@
                     <a:p>
                       <a:pPr algn="ctr"/>
                       <a:r>
-                        <a:rPr lang="pt-BR" dirty="0" smtClean="0"/>
+                        <a:rPr lang="pt-BR" dirty="0"/>
                         <a:t>52.778, 52.274, 60.324, 59.07, 112.418, 97.007, 78.354, 117.761, 52.395, 89.974</a:t>
                       </a:r>
-                      <a:endParaRPr lang="pt-BR" dirty="0"/>
-                    </a:p>
-                  </a:txBody>
-                  <a:tcPr/>
-                </a:tc>
+                    </a:p>
+                  </a:txBody>
+                  <a:tcPr/>
+                </a:tc>
+                <a:extLst>
+                  <a:ext uri="{0D108BD9-81ED-4DB2-BD59-A6C34878D82A}">
+                    <a16:rowId xmlns:a16="http://schemas.microsoft.com/office/drawing/2014/main" val="10004"/>
+                  </a:ext>
+                </a:extLst>
               </a:tr>
               <a:tr h="370840">
                 <a:tc>
@@ -3258,13 +3253,18 @@
                     <a:p>
                       <a:pPr algn="ctr"/>
                       <a:r>
-                        <a:rPr lang="pt-BR" dirty="0" smtClean="0"/>
+                        <a:rPr lang="pt-BR" dirty="0"/>
                         <a:t>58.738, 52.182, 52.322, 52.281, 110.554, 109.5, 76.448, 113.858, 61.638, 89.571</a:t>
                       </a:r>
                     </a:p>
                   </a:txBody>
                   <a:tcPr/>
                 </a:tc>
+                <a:extLst>
+                  <a:ext uri="{0D108BD9-81ED-4DB2-BD59-A6C34878D82A}">
+                    <a16:rowId xmlns:a16="http://schemas.microsoft.com/office/drawing/2014/main" val="10005"/>
+                  </a:ext>
+                </a:extLst>
               </a:tr>
             </a:tbl>
           </a:graphicData>
@@ -3275,13 +3275,6 @@
   <p:clrMapOvr>
     <a:masterClrMapping/>
   </p:clrMapOvr>
-  <p:timing>
-    <p:tnLst>
-      <p:par>
-        <p:cTn id="1" dur="indefinite" restart="never" nodeType="tmRoot"/>
-      </p:par>
-    </p:tnLst>
-  </p:timing>
 </p:sld>
 </file>
 
@@ -3333,15 +3326,15 @@
               <a:t> </a:t>
             </a:r>
             <a:r>
-              <a:rPr lang="pt-BR" dirty="0" err="1" smtClean="0"/>
+              <a:rPr lang="pt-BR" dirty="0" err="1"/>
               <a:t>Random</a:t>
             </a:r>
             <a:r>
-              <a:rPr lang="pt-BR" dirty="0" smtClean="0"/>
+              <a:rPr lang="pt-BR" dirty="0"/>
               <a:t> </a:t>
             </a:r>
             <a:r>
-              <a:rPr lang="pt-BR" dirty="0" err="1" smtClean="0"/>
+              <a:rPr lang="pt-BR" dirty="0" err="1"/>
               <a:t>Walk</a:t>
             </a:r>
             <a:endParaRPr lang="pt-BR" dirty="0"/>
@@ -3382,13 +3375,6 @@
   <p:clrMapOvr>
     <a:masterClrMapping/>
   </p:clrMapOvr>
-  <p:timing>
-    <p:tnLst>
-      <p:par>
-        <p:cTn id="1" dur="indefinite" restart="never" nodeType="tmRoot"/>
-      </p:par>
-    </p:tnLst>
-  </p:timing>
 </p:sld>
 </file>
 
@@ -3489,13 +3475,6 @@
   <p:clrMapOvr>
     <a:masterClrMapping/>
   </p:clrMapOvr>
-  <p:timing>
-    <p:tnLst>
-      <p:par>
-        <p:cTn id="1" dur="indefinite" restart="never" nodeType="tmRoot"/>
-      </p:par>
-    </p:tnLst>
-  </p:timing>
 </p:sld>
 </file>
 
@@ -3589,32 +3568,31 @@
           <a:p>
             <a:pPr algn="just"/>
             <a:r>
-              <a:rPr lang="pt-BR" dirty="0" smtClean="0"/>
+              <a:rPr lang="pt-BR" dirty="0"/>
               <a:t>Observa-se um desvio-padrão próximo de zero logo no inicio do AG, porém este valor não é zero, mas sim próximo de zero, sendo assim acaba não aparecendo no gráfico, como mostra a tabela.</a:t>
             </a:r>
           </a:p>
           <a:p>
-            <a:endParaRPr lang="pt-BR" dirty="0" smtClean="0"/>
-          </a:p>
-          <a:p>
             <a:endParaRPr lang="pt-BR" dirty="0"/>
           </a:p>
           <a:p>
-            <a:endParaRPr lang="pt-BR" dirty="0" smtClean="0"/>
-          </a:p>
-          <a:p>
             <a:endParaRPr lang="pt-BR" dirty="0"/>
           </a:p>
           <a:p>
-            <a:endParaRPr lang="pt-BR" dirty="0" smtClean="0"/>
+            <a:endParaRPr lang="pt-BR" dirty="0"/>
+          </a:p>
+          <a:p>
+            <a:endParaRPr lang="pt-BR" dirty="0"/>
+          </a:p>
+          <a:p>
+            <a:endParaRPr lang="pt-BR" dirty="0"/>
           </a:p>
           <a:p>
             <a:pPr algn="just"/>
             <a:r>
-              <a:rPr lang="pt-BR" dirty="0" smtClean="0"/>
+              <a:rPr lang="pt-BR" dirty="0"/>
               <a:t>Esse comportamento se repete para os outros casos do AG.</a:t>
             </a:r>
-            <a:endParaRPr lang="pt-BR" dirty="0"/>
           </a:p>
         </p:txBody>
       </p:sp>
@@ -3637,7 +3615,13 @@
                 <a:tableStyleId>{5C22544A-7EE6-4342-B048-85BDC9FD1C3A}</a:tableStyleId>
               </a:tblPr>
               <a:tblGrid>
-                <a:gridCol w="4386383"/>
+                <a:gridCol w="4386383">
+                  <a:extLst>
+                    <a:ext uri="{9D8B030D-6E8A-4147-A177-3AD203B41FA5}">
+                      <a16:colId xmlns:a16="http://schemas.microsoft.com/office/drawing/2014/main" val="20000"/>
+                    </a:ext>
+                  </a:extLst>
+                </a:gridCol>
               </a:tblGrid>
               <a:tr h="534768">
                 <a:tc>
@@ -3647,11 +3631,11 @@
                     <a:p>
                       <a:pPr algn="ctr"/>
                       <a:r>
-                        <a:rPr lang="pt-BR" dirty="0" smtClean="0"/>
+                        <a:rPr lang="pt-BR" dirty="0"/>
                         <a:t>Desvio-Padrão</a:t>
                       </a:r>
                       <a:r>
-                        <a:rPr lang="pt-BR" baseline="0" dirty="0" smtClean="0"/>
+                        <a:rPr lang="pt-BR" baseline="0" dirty="0"/>
                         <a:t> das 5 primeiras geração com Palavra 10 e População 50</a:t>
                       </a:r>
                       <a:endParaRPr lang="pt-BR" dirty="0"/>
@@ -3659,6 +3643,11 @@
                   </a:txBody>
                   <a:tcPr/>
                 </a:tc>
+                <a:extLst>
+                  <a:ext uri="{0D108BD9-81ED-4DB2-BD59-A6C34878D82A}">
+                    <a16:rowId xmlns:a16="http://schemas.microsoft.com/office/drawing/2014/main" val="10000"/>
+                  </a:ext>
+                </a:extLst>
               </a:tr>
               <a:tr h="305581">
                 <a:tc>
@@ -3668,14 +3657,18 @@
                     <a:p>
                       <a:pPr algn="ctr"/>
                       <a:r>
-                        <a:rPr lang="pt-BR" dirty="0" smtClean="0"/>
+                        <a:rPr lang="pt-BR" dirty="0"/>
                         <a:t>8.735201856926767556e-04</a:t>
                       </a:r>
-                      <a:endParaRPr lang="pt-BR" dirty="0"/>
-                    </a:p>
-                  </a:txBody>
-                  <a:tcPr/>
-                </a:tc>
+                    </a:p>
+                  </a:txBody>
+                  <a:tcPr/>
+                </a:tc>
+                <a:extLst>
+                  <a:ext uri="{0D108BD9-81ED-4DB2-BD59-A6C34878D82A}">
+                    <a16:rowId xmlns:a16="http://schemas.microsoft.com/office/drawing/2014/main" val="10001"/>
+                  </a:ext>
+                </a:extLst>
               </a:tr>
               <a:tr h="305581">
                 <a:tc>
@@ -3685,14 +3678,18 @@
                     <a:p>
                       <a:pPr algn="ctr"/>
                       <a:r>
-                        <a:rPr lang="pt-BR" dirty="0" smtClean="0"/>
+                        <a:rPr lang="pt-BR" dirty="0"/>
                         <a:t>8.425736660485068190e-04</a:t>
                       </a:r>
-                      <a:endParaRPr lang="pt-BR" dirty="0"/>
-                    </a:p>
-                  </a:txBody>
-                  <a:tcPr/>
-                </a:tc>
+                    </a:p>
+                  </a:txBody>
+                  <a:tcPr/>
+                </a:tc>
+                <a:extLst>
+                  <a:ext uri="{0D108BD9-81ED-4DB2-BD59-A6C34878D82A}">
+                    <a16:rowId xmlns:a16="http://schemas.microsoft.com/office/drawing/2014/main" val="10002"/>
+                  </a:ext>
+                </a:extLst>
               </a:tr>
               <a:tr h="305581">
                 <a:tc>
@@ -3702,14 +3699,18 @@
                     <a:p>
                       <a:pPr algn="ctr"/>
                       <a:r>
-                        <a:rPr lang="pt-BR" dirty="0" smtClean="0"/>
+                        <a:rPr lang="pt-BR" dirty="0"/>
                         <a:t>8.082386781566681597e-04</a:t>
                       </a:r>
-                      <a:endParaRPr lang="pt-BR" dirty="0"/>
-                    </a:p>
-                  </a:txBody>
-                  <a:tcPr/>
-                </a:tc>
+                    </a:p>
+                  </a:txBody>
+                  <a:tcPr/>
+                </a:tc>
+                <a:extLst>
+                  <a:ext uri="{0D108BD9-81ED-4DB2-BD59-A6C34878D82A}">
+                    <a16:rowId xmlns:a16="http://schemas.microsoft.com/office/drawing/2014/main" val="10003"/>
+                  </a:ext>
+                </a:extLst>
               </a:tr>
               <a:tr h="305581">
                 <a:tc>
@@ -3719,14 +3720,18 @@
                     <a:p>
                       <a:pPr algn="ctr"/>
                       <a:r>
-                        <a:rPr lang="pt-BR" dirty="0" smtClean="0"/>
+                        <a:rPr lang="pt-BR" dirty="0"/>
                         <a:t>8.066907344651185960e-04</a:t>
                       </a:r>
-                      <a:endParaRPr lang="pt-BR" dirty="0"/>
-                    </a:p>
-                  </a:txBody>
-                  <a:tcPr/>
-                </a:tc>
+                    </a:p>
+                  </a:txBody>
+                  <a:tcPr/>
+                </a:tc>
+                <a:extLst>
+                  <a:ext uri="{0D108BD9-81ED-4DB2-BD59-A6C34878D82A}">
+                    <a16:rowId xmlns:a16="http://schemas.microsoft.com/office/drawing/2014/main" val="10004"/>
+                  </a:ext>
+                </a:extLst>
               </a:tr>
               <a:tr h="305581">
                 <a:tc>
@@ -3736,14 +3741,18 @@
                     <a:p>
                       <a:pPr algn="ctr"/>
                       <a:r>
-                        <a:rPr lang="pt-BR" dirty="0" smtClean="0"/>
+                        <a:rPr lang="pt-BR" dirty="0"/>
                         <a:t>7.932852442757415802e-04</a:t>
                       </a:r>
-                      <a:endParaRPr lang="pt-BR" dirty="0"/>
-                    </a:p>
-                  </a:txBody>
-                  <a:tcPr/>
-                </a:tc>
+                    </a:p>
+                  </a:txBody>
+                  <a:tcPr/>
+                </a:tc>
+                <a:extLst>
+                  <a:ext uri="{0D108BD9-81ED-4DB2-BD59-A6C34878D82A}">
+                    <a16:rowId xmlns:a16="http://schemas.microsoft.com/office/drawing/2014/main" val="10005"/>
+                  </a:ext>
+                </a:extLst>
               </a:tr>
             </a:tbl>
           </a:graphicData>
@@ -3863,7 +3872,13 @@
                 <a:tableStyleId>{5C22544A-7EE6-4342-B048-85BDC9FD1C3A}</a:tableStyleId>
               </a:tblPr>
               <a:tblGrid>
-                <a:gridCol w="10515600"/>
+                <a:gridCol w="10515600">
+                  <a:extLst>
+                    <a:ext uri="{9D8B030D-6E8A-4147-A177-3AD203B41FA5}">
+                      <a16:colId xmlns:a16="http://schemas.microsoft.com/office/drawing/2014/main" val="20000"/>
+                    </a:ext>
+                  </a:extLst>
+                </a:gridCol>
               </a:tblGrid>
               <a:tr h="370840">
                 <a:tc>
@@ -3888,21 +3903,26 @@
                         <a:defRPr/>
                       </a:pPr>
                       <a:r>
-                        <a:rPr lang="pt-BR" dirty="0" smtClean="0"/>
+                        <a:rPr lang="pt-BR" dirty="0"/>
                         <a:t>Soluções Encontradas para 20 caracteres da Palavra-Alvo (AG,</a:t>
                       </a:r>
                       <a:r>
-                        <a:rPr lang="pt-BR" baseline="0" dirty="0" smtClean="0"/>
+                        <a:rPr lang="pt-BR" baseline="0" dirty="0"/>
                         <a:t> </a:t>
                       </a:r>
                       <a:r>
-                        <a:rPr lang="pt-BR" dirty="0" smtClean="0"/>
+                        <a:rPr lang="pt-BR" dirty="0"/>
                         <a:t>População 50)</a:t>
                       </a:r>
                     </a:p>
                   </a:txBody>
                   <a:tcPr/>
                 </a:tc>
+                <a:extLst>
+                  <a:ext uri="{0D108BD9-81ED-4DB2-BD59-A6C34878D82A}">
+                    <a16:rowId xmlns:a16="http://schemas.microsoft.com/office/drawing/2014/main" val="10000"/>
+                  </a:ext>
+                </a:extLst>
               </a:tr>
               <a:tr h="370840">
                 <a:tc>
@@ -3911,14 +3931,18 @@
                     <a:lstStyle/>
                     <a:p>
                       <a:r>
-                        <a:rPr lang="pt-BR" dirty="0" smtClean="0"/>
+                        <a:rPr lang="pt-BR" dirty="0"/>
                         <a:t>52.547, 72.15, 53.694, 57.771, 115.88, 105.59, 75.368, 126.02, 52.756, 85.1, 80.525, 111.24, 113.62, 64.95, 89.181, 85.647, 101.71, 106.75, 110.37, 72.082</a:t>
                       </a:r>
-                      <a:endParaRPr lang="pt-BR" dirty="0"/>
-                    </a:p>
-                  </a:txBody>
-                  <a:tcPr/>
-                </a:tc>
+                    </a:p>
+                  </a:txBody>
+                  <a:tcPr/>
+                </a:tc>
+                <a:extLst>
+                  <a:ext uri="{0D108BD9-81ED-4DB2-BD59-A6C34878D82A}">
+                    <a16:rowId xmlns:a16="http://schemas.microsoft.com/office/drawing/2014/main" val="10001"/>
+                  </a:ext>
+                </a:extLst>
               </a:tr>
               <a:tr h="370840">
                 <a:tc>
@@ -3927,14 +3951,18 @@
                     <a:lstStyle/>
                     <a:p>
                       <a:r>
-                        <a:rPr lang="pt-BR" dirty="0" smtClean="0"/>
+                        <a:rPr lang="pt-BR" dirty="0"/>
                         <a:t>52.547, 72.15, 53.694, 57.771, 115.88, 105.59, 75.368, 126.02, 52.756, 85.1, 80.525, 111.24, 113.62, 64.95, 89.181, 85.647, 101.71, 106.75, 110.37, 72.082</a:t>
                       </a:r>
-                      <a:endParaRPr lang="pt-BR" dirty="0"/>
-                    </a:p>
-                  </a:txBody>
-                  <a:tcPr/>
-                </a:tc>
+                    </a:p>
+                  </a:txBody>
+                  <a:tcPr/>
+                </a:tc>
+                <a:extLst>
+                  <a:ext uri="{0D108BD9-81ED-4DB2-BD59-A6C34878D82A}">
+                    <a16:rowId xmlns:a16="http://schemas.microsoft.com/office/drawing/2014/main" val="10002"/>
+                  </a:ext>
+                </a:extLst>
               </a:tr>
               <a:tr h="370840">
                 <a:tc>
@@ -3943,14 +3971,18 @@
                     <a:lstStyle/>
                     <a:p>
                       <a:r>
-                        <a:rPr lang="pt-BR" dirty="0" smtClean="0"/>
+                        <a:rPr lang="pt-BR" dirty="0"/>
                         <a:t>52.547, 72.15, 53.694, 57.771, 115.88, 105.59, 75.368, 126.02, 52.756, 85.1, 80.525, 111.24, 113.62, 64.95, 89.181, 85.647, 101.71, 106.75, 110.37, 72.082</a:t>
                       </a:r>
-                      <a:endParaRPr lang="pt-BR" dirty="0"/>
-                    </a:p>
-                  </a:txBody>
-                  <a:tcPr/>
-                </a:tc>
+                    </a:p>
+                  </a:txBody>
+                  <a:tcPr/>
+                </a:tc>
+                <a:extLst>
+                  <a:ext uri="{0D108BD9-81ED-4DB2-BD59-A6C34878D82A}">
+                    <a16:rowId xmlns:a16="http://schemas.microsoft.com/office/drawing/2014/main" val="10003"/>
+                  </a:ext>
+                </a:extLst>
               </a:tr>
               <a:tr h="370840">
                 <a:tc>
@@ -3959,14 +3991,18 @@
                     <a:lstStyle/>
                     <a:p>
                       <a:r>
-                        <a:rPr lang="pt-BR" dirty="0" smtClean="0"/>
+                        <a:rPr lang="pt-BR" dirty="0"/>
                         <a:t>52.547, 72.15, 53.694, 57.771, 115.88, 105.59, 75.368, 126.02, 52.756, 85.1, 80.525, 111.24, 113.62, 64.95, 89.181, 85.647, 101.71, 106.75, 110.37, 72.082</a:t>
                       </a:r>
-                      <a:endParaRPr lang="pt-BR" dirty="0"/>
-                    </a:p>
-                  </a:txBody>
-                  <a:tcPr/>
-                </a:tc>
+                    </a:p>
+                  </a:txBody>
+                  <a:tcPr/>
+                </a:tc>
+                <a:extLst>
+                  <a:ext uri="{0D108BD9-81ED-4DB2-BD59-A6C34878D82A}">
+                    <a16:rowId xmlns:a16="http://schemas.microsoft.com/office/drawing/2014/main" val="10004"/>
+                  </a:ext>
+                </a:extLst>
               </a:tr>
               <a:tr h="370840">
                 <a:tc>
@@ -3975,14 +4011,18 @@
                     <a:lstStyle/>
                     <a:p>
                       <a:r>
-                        <a:rPr lang="pt-BR" dirty="0" smtClean="0"/>
+                        <a:rPr lang="pt-BR" dirty="0"/>
                         <a:t>52.547, 72.15, 53.694, 57.771, 115.88, 105.59, 75.368, 126.02, 52.756, 85.1, 80.525, 111.24, 113.62, 64.95, 89.181, 85.647, 101.71, 106.75, 110.37, 72.082</a:t>
                       </a:r>
-                      <a:endParaRPr lang="pt-BR" dirty="0"/>
-                    </a:p>
-                  </a:txBody>
-                  <a:tcPr/>
-                </a:tc>
+                    </a:p>
+                  </a:txBody>
+                  <a:tcPr/>
+                </a:tc>
+                <a:extLst>
+                  <a:ext uri="{0D108BD9-81ED-4DB2-BD59-A6C34878D82A}">
+                    <a16:rowId xmlns:a16="http://schemas.microsoft.com/office/drawing/2014/main" val="10005"/>
+                  </a:ext>
+                </a:extLst>
               </a:tr>
             </a:tbl>
           </a:graphicData>
@@ -3993,13 +4033,6 @@
   <p:clrMapOvr>
     <a:masterClrMapping/>
   </p:clrMapOvr>
-  <p:timing>
-    <p:tnLst>
-      <p:par>
-        <p:cTn id="1" dur="indefinite" restart="never" nodeType="tmRoot"/>
-      </p:par>
-    </p:tnLst>
-  </p:timing>
 </p:sld>
 </file>
 
@@ -4085,7 +4118,13 @@
                 <a:tableStyleId>{5C22544A-7EE6-4342-B048-85BDC9FD1C3A}</a:tableStyleId>
               </a:tblPr>
               <a:tblGrid>
-                <a:gridCol w="10515600"/>
+                <a:gridCol w="10515600">
+                  <a:extLst>
+                    <a:ext uri="{9D8B030D-6E8A-4147-A177-3AD203B41FA5}">
+                      <a16:colId xmlns:a16="http://schemas.microsoft.com/office/drawing/2014/main" val="20000"/>
+                    </a:ext>
+                  </a:extLst>
+                </a:gridCol>
               </a:tblGrid>
               <a:tr h="370840">
                 <a:tc>
@@ -4110,37 +4149,42 @@
                         <a:defRPr/>
                       </a:pPr>
                       <a:r>
-                        <a:rPr lang="pt-BR" dirty="0" smtClean="0"/>
+                        <a:rPr lang="pt-BR" dirty="0"/>
                         <a:t>Soluções Encontradas para 20 caracteres da Palavra-Alvo (</a:t>
                       </a:r>
                       <a:r>
-                        <a:rPr lang="pt-BR" dirty="0" err="1" smtClean="0"/>
+                        <a:rPr lang="pt-BR" dirty="0" err="1"/>
                         <a:t>Random</a:t>
                       </a:r>
                       <a:r>
-                        <a:rPr lang="pt-BR" dirty="0" smtClean="0"/>
+                        <a:rPr lang="pt-BR" dirty="0"/>
                         <a:t> </a:t>
                       </a:r>
                       <a:r>
-                        <a:rPr lang="pt-BR" dirty="0" err="1" smtClean="0"/>
+                        <a:rPr lang="pt-BR" dirty="0" err="1"/>
                         <a:t>Walk</a:t>
                       </a:r>
                       <a:r>
-                        <a:rPr lang="pt-BR" dirty="0" smtClean="0"/>
+                        <a:rPr lang="pt-BR" dirty="0"/>
                         <a:t>,</a:t>
                       </a:r>
                       <a:r>
-                        <a:rPr lang="pt-BR" baseline="0" dirty="0" smtClean="0"/>
+                        <a:rPr lang="pt-BR" baseline="0" dirty="0"/>
                         <a:t> </a:t>
                       </a:r>
                       <a:r>
-                        <a:rPr lang="pt-BR" dirty="0" smtClean="0"/>
+                        <a:rPr lang="pt-BR" dirty="0"/>
                         <a:t>População 50)</a:t>
                       </a:r>
                     </a:p>
                   </a:txBody>
                   <a:tcPr/>
                 </a:tc>
+                <a:extLst>
+                  <a:ext uri="{0D108BD9-81ED-4DB2-BD59-A6C34878D82A}">
+                    <a16:rowId xmlns:a16="http://schemas.microsoft.com/office/drawing/2014/main" val="10000"/>
+                  </a:ext>
+                </a:extLst>
               </a:tr>
               <a:tr h="370840">
                 <a:tc>
@@ -4149,14 +4193,18 @@
                     <a:lstStyle/>
                     <a:p>
                       <a:r>
-                        <a:rPr lang="pt-BR" dirty="0" smtClean="0"/>
+                        <a:rPr lang="pt-BR" dirty="0"/>
                         <a:t>52.046, 76.91, 52.546, 58.572, 107.802, 102.557, 82.675, 115.783, 56.561, 82.476, 96.082, 122.356, 81.572, 82.836, 104.6, 72.081, 123.255, 124.258, 104.132, 68.263</a:t>
                       </a:r>
-                      <a:endParaRPr lang="pt-BR" dirty="0"/>
-                    </a:p>
-                  </a:txBody>
-                  <a:tcPr/>
-                </a:tc>
+                    </a:p>
+                  </a:txBody>
+                  <a:tcPr/>
+                </a:tc>
+                <a:extLst>
+                  <a:ext uri="{0D108BD9-81ED-4DB2-BD59-A6C34878D82A}">
+                    <a16:rowId xmlns:a16="http://schemas.microsoft.com/office/drawing/2014/main" val="10001"/>
+                  </a:ext>
+                </a:extLst>
               </a:tr>
               <a:tr h="370840">
                 <a:tc>
@@ -4165,14 +4213,18 @@
                     <a:lstStyle/>
                     <a:p>
                       <a:r>
-                        <a:rPr lang="pt-BR" dirty="0" smtClean="0"/>
+                        <a:rPr lang="pt-BR" dirty="0"/>
                         <a:t>78.128, 65.933, 53.529, 61.787, 116.977, 102.489, 63.134, 122.552, 57.448, 65.138, 58.092, 114.942, 117.57, 77.719, 102.918, 96.722, 108.535, 105.372, 101.415, 68.574</a:t>
                       </a:r>
-                      <a:endParaRPr lang="pt-BR" dirty="0"/>
-                    </a:p>
-                  </a:txBody>
-                  <a:tcPr/>
-                </a:tc>
+                    </a:p>
+                  </a:txBody>
+                  <a:tcPr/>
+                </a:tc>
+                <a:extLst>
+                  <a:ext uri="{0D108BD9-81ED-4DB2-BD59-A6C34878D82A}">
+                    <a16:rowId xmlns:a16="http://schemas.microsoft.com/office/drawing/2014/main" val="10002"/>
+                  </a:ext>
+                </a:extLst>
               </a:tr>
               <a:tr h="370840">
                 <a:tc>
@@ -4181,14 +4233,18 @@
                     <a:lstStyle/>
                     <a:p>
                       <a:r>
-                        <a:rPr lang="pt-BR" dirty="0" smtClean="0"/>
+                        <a:rPr lang="pt-BR" dirty="0"/>
                         <a:t>67.116, 70.266, 63.55, 62.643, 115.689, 77.168, 86.848, 101.192, 70.47, 86.127, 71.462, 107.138, 106.171, 76.984, 74.029, 100.186, 104.49, 103.712, 107.896, 74.955</a:t>
                       </a:r>
-                      <a:endParaRPr lang="pt-BR" dirty="0"/>
-                    </a:p>
-                  </a:txBody>
-                  <a:tcPr/>
-                </a:tc>
+                    </a:p>
+                  </a:txBody>
+                  <a:tcPr/>
+                </a:tc>
+                <a:extLst>
+                  <a:ext uri="{0D108BD9-81ED-4DB2-BD59-A6C34878D82A}">
+                    <a16:rowId xmlns:a16="http://schemas.microsoft.com/office/drawing/2014/main" val="10003"/>
+                  </a:ext>
+                </a:extLst>
               </a:tr>
               <a:tr h="370840">
                 <a:tc>
@@ -4197,14 +4253,18 @@
                     <a:lstStyle/>
                     <a:p>
                       <a:r>
-                        <a:rPr lang="pt-BR" dirty="0" smtClean="0"/>
+                        <a:rPr lang="pt-BR" dirty="0"/>
                         <a:t>72.546, 56.898, 75.223, 90.719, 112.351, 105.638, 71.309, 123.529, 61.138, 97.984, 88.765, 124.439, 107.294, 64.923, 100.926, 82.166, 80.944, 95.038, 120.294, 68.466</a:t>
                       </a:r>
-                      <a:endParaRPr lang="pt-BR" dirty="0"/>
-                    </a:p>
-                  </a:txBody>
-                  <a:tcPr/>
-                </a:tc>
+                    </a:p>
+                  </a:txBody>
+                  <a:tcPr/>
+                </a:tc>
+                <a:extLst>
+                  <a:ext uri="{0D108BD9-81ED-4DB2-BD59-A6C34878D82A}">
+                    <a16:rowId xmlns:a16="http://schemas.microsoft.com/office/drawing/2014/main" val="10004"/>
+                  </a:ext>
+                </a:extLst>
               </a:tr>
               <a:tr h="370840">
                 <a:tc>
@@ -4213,14 +4273,18 @@
                     <a:lstStyle/>
                     <a:p>
                       <a:r>
-                        <a:rPr lang="pt-BR" dirty="0" smtClean="0"/>
+                        <a:rPr lang="pt-BR" dirty="0"/>
                         <a:t>67.815, 73.984, 50.413, 51.085, 120.244, 103.68, 70.052, 97.825, 53.857, 82.368, 69.25, 104.047, 101.44, 68.077, 79.573, 115.715, 108.679, 107.133, 115.585, 80.434</a:t>
                       </a:r>
-                      <a:endParaRPr lang="pt-BR" dirty="0"/>
-                    </a:p>
-                  </a:txBody>
-                  <a:tcPr/>
-                </a:tc>
+                    </a:p>
+                  </a:txBody>
+                  <a:tcPr/>
+                </a:tc>
+                <a:extLst>
+                  <a:ext uri="{0D108BD9-81ED-4DB2-BD59-A6C34878D82A}">
+                    <a16:rowId xmlns:a16="http://schemas.microsoft.com/office/drawing/2014/main" val="10005"/>
+                  </a:ext>
+                </a:extLst>
               </a:tr>
             </a:tbl>
           </a:graphicData>
@@ -4231,13 +4295,6 @@
   <p:clrMapOvr>
     <a:masterClrMapping/>
   </p:clrMapOvr>
-  <p:timing>
-    <p:tnLst>
-      <p:par>
-        <p:cTn id="1" dur="indefinite" restart="never" nodeType="tmRoot"/>
-      </p:par>
-    </p:tnLst>
-  </p:timing>
 </p:sld>
 </file>
 
@@ -4297,7 +4354,7 @@
               <a:t> </a:t>
             </a:r>
             <a:r>
-              <a:rPr lang="pt-BR" dirty="0" err="1" smtClean="0"/>
+              <a:rPr lang="pt-BR" dirty="0" err="1"/>
               <a:t>Walk</a:t>
             </a:r>
             <a:endParaRPr lang="pt-BR" dirty="0"/>
@@ -4338,13 +4395,6 @@
   <p:clrMapOvr>
     <a:masterClrMapping/>
   </p:clrMapOvr>
-  <p:timing>
-    <p:tnLst>
-      <p:par>
-        <p:cTn id="1" dur="indefinite" restart="never" nodeType="tmRoot"/>
-      </p:par>
-    </p:tnLst>
-  </p:timing>
 </p:sld>
 </file>
 
@@ -4443,13 +4493,6 @@
   <p:clrMapOvr>
     <a:masterClrMapping/>
   </p:clrMapOvr>
-  <p:timing>
-    <p:tnLst>
-      <p:par>
-        <p:cTn id="1" dur="indefinite" restart="never" nodeType="tmRoot"/>
-      </p:par>
-    </p:tnLst>
-  </p:timing>
 </p:sld>
 </file>
 
@@ -4535,7 +4578,13 @@
                 <a:tableStyleId>{5C22544A-7EE6-4342-B048-85BDC9FD1C3A}</a:tableStyleId>
               </a:tblPr>
               <a:tblGrid>
-                <a:gridCol w="10515600"/>
+                <a:gridCol w="10515600">
+                  <a:extLst>
+                    <a:ext uri="{9D8B030D-6E8A-4147-A177-3AD203B41FA5}">
+                      <a16:colId xmlns:a16="http://schemas.microsoft.com/office/drawing/2014/main" val="20000"/>
+                    </a:ext>
+                  </a:extLst>
+                </a:gridCol>
               </a:tblGrid>
               <a:tr h="370840">
                 <a:tc>
@@ -4560,21 +4609,26 @@
                         <a:defRPr/>
                       </a:pPr>
                       <a:r>
-                        <a:rPr lang="pt-BR" dirty="0" smtClean="0"/>
+                        <a:rPr lang="pt-BR" dirty="0"/>
                         <a:t>Soluções Encontradas para 30 caracteres da Palavra-Alvo (AG,</a:t>
                       </a:r>
                       <a:r>
-                        <a:rPr lang="pt-BR" baseline="0" dirty="0" smtClean="0"/>
+                        <a:rPr lang="pt-BR" baseline="0" dirty="0"/>
                         <a:t> </a:t>
                       </a:r>
                       <a:r>
-                        <a:rPr lang="pt-BR" dirty="0" smtClean="0"/>
+                        <a:rPr lang="pt-BR" dirty="0"/>
                         <a:t>População 50)</a:t>
                       </a:r>
                     </a:p>
                   </a:txBody>
                   <a:tcPr/>
                 </a:tc>
+                <a:extLst>
+                  <a:ext uri="{0D108BD9-81ED-4DB2-BD59-A6C34878D82A}">
+                    <a16:rowId xmlns:a16="http://schemas.microsoft.com/office/drawing/2014/main" val="10000"/>
+                  </a:ext>
+                </a:extLst>
               </a:tr>
               <a:tr h="370840">
                 <a:tc>
@@ -4583,14 +4637,18 @@
                     <a:lstStyle/>
                     <a:p>
                       <a:r>
-                        <a:rPr lang="pt-BR" dirty="0" smtClean="0"/>
+                        <a:rPr lang="pt-BR" dirty="0"/>
                         <a:t>52.547, 72.15, 53.694, 57.771, 115.88, 105.59, 75.368, 126.02, 52.756, 85.1, 80.525, 111.24, 113.62, 64.95, 89.181, 85.647, 101.71, 106.75, 110.37, 72.082, 104.38, 102.41, 63.009, 59.52, 89.869, 126.78, 77.231, 96.821, 67.905, 110.1</a:t>
                       </a:r>
-                      <a:endParaRPr lang="pt-BR" dirty="0"/>
-                    </a:p>
-                  </a:txBody>
-                  <a:tcPr/>
-                </a:tc>
+                    </a:p>
+                  </a:txBody>
+                  <a:tcPr/>
+                </a:tc>
+                <a:extLst>
+                  <a:ext uri="{0D108BD9-81ED-4DB2-BD59-A6C34878D82A}">
+                    <a16:rowId xmlns:a16="http://schemas.microsoft.com/office/drawing/2014/main" val="10001"/>
+                  </a:ext>
+                </a:extLst>
               </a:tr>
               <a:tr h="370840">
                 <a:tc>
@@ -4599,14 +4657,18 @@
                     <a:lstStyle/>
                     <a:p>
                       <a:r>
-                        <a:rPr lang="pt-BR" dirty="0" smtClean="0"/>
+                        <a:rPr lang="pt-BR" dirty="0"/>
                         <a:t>52.547, 72.15, 53.694, 57.771, 115.88, 105.59, 75.368, 126.02, 52.756, 85.1, 80.525, 111.24, 113.62, 64.95, 89.181, 85.647, 101.71, 106.75, 110.37, 72.082, 104.38, 102.41, 63.009, 59.52, 89.869, 126.78, 77.231, 96.821, 67.905, 110.1</a:t>
                       </a:r>
-                      <a:endParaRPr lang="pt-BR" dirty="0"/>
-                    </a:p>
-                  </a:txBody>
-                  <a:tcPr/>
-                </a:tc>
+                    </a:p>
+                  </a:txBody>
+                  <a:tcPr/>
+                </a:tc>
+                <a:extLst>
+                  <a:ext uri="{0D108BD9-81ED-4DB2-BD59-A6C34878D82A}">
+                    <a16:rowId xmlns:a16="http://schemas.microsoft.com/office/drawing/2014/main" val="10002"/>
+                  </a:ext>
+                </a:extLst>
               </a:tr>
               <a:tr h="370840">
                 <a:tc>
@@ -4615,14 +4677,18 @@
                     <a:lstStyle/>
                     <a:p>
                       <a:r>
-                        <a:rPr lang="pt-BR" dirty="0" smtClean="0"/>
+                        <a:rPr lang="pt-BR" dirty="0"/>
                         <a:t>52.547, 72.15, 53.694, 57.771, 115.88, 105.59, 75.368, 126.02, 52.756, 85.1, 80.525, 111.24, 113.62, 64.95, 89.181, 85.647, 101.71, 106.75, 110.37, 72.082, 104.38, 102.41, 63.009, 59.52, 89.869, 126.78, 77.231, 96.821, 67.905, 110.1</a:t>
                       </a:r>
-                      <a:endParaRPr lang="pt-BR" dirty="0"/>
-                    </a:p>
-                  </a:txBody>
-                  <a:tcPr/>
-                </a:tc>
+                    </a:p>
+                  </a:txBody>
+                  <a:tcPr/>
+                </a:tc>
+                <a:extLst>
+                  <a:ext uri="{0D108BD9-81ED-4DB2-BD59-A6C34878D82A}">
+                    <a16:rowId xmlns:a16="http://schemas.microsoft.com/office/drawing/2014/main" val="10003"/>
+                  </a:ext>
+                </a:extLst>
               </a:tr>
               <a:tr h="370840">
                 <a:tc>
@@ -4631,14 +4697,18 @@
                     <a:lstStyle/>
                     <a:p>
                       <a:r>
-                        <a:rPr lang="pt-BR" dirty="0" smtClean="0"/>
+                        <a:rPr lang="pt-BR" dirty="0"/>
                         <a:t>52.547, 72.15, 53.694, 57.771, 115.88, 105.59, 75.368, 126.02, 52.756, 85.1, 80.525, 111.24, 113.62, 64.95, 89.181, 85.647, 101.71, 106.75, 110.37, 72.082, 104.38, 102.41, 63.009, 59.52, 89.869, 126.78, 77.231, 96.821, 67.905, 110.1</a:t>
                       </a:r>
-                      <a:endParaRPr lang="pt-BR" dirty="0"/>
-                    </a:p>
-                  </a:txBody>
-                  <a:tcPr/>
-                </a:tc>
+                    </a:p>
+                  </a:txBody>
+                  <a:tcPr/>
+                </a:tc>
+                <a:extLst>
+                  <a:ext uri="{0D108BD9-81ED-4DB2-BD59-A6C34878D82A}">
+                    <a16:rowId xmlns:a16="http://schemas.microsoft.com/office/drawing/2014/main" val="10004"/>
+                  </a:ext>
+                </a:extLst>
               </a:tr>
               <a:tr h="370840">
                 <a:tc>
@@ -4647,14 +4717,18 @@
                     <a:lstStyle/>
                     <a:p>
                       <a:r>
-                        <a:rPr lang="pt-BR" dirty="0" smtClean="0"/>
+                        <a:rPr lang="pt-BR" dirty="0"/>
                         <a:t>52.547, 72.15, 53.694, 57.771, 115.88, 105.59, 75.368, 126.02, 52.756, 85.1, 80.525, 111.24, 113.62, 64.95, 89.181, 85.647, 101.71, 106.75, 110.37, 72.082, 104.38, 102.41, 63.009, 59.52, 89.869, 126.78, 77.231, 96.821, 67.905, 110.1</a:t>
                       </a:r>
-                      <a:endParaRPr lang="pt-BR" dirty="0"/>
-                    </a:p>
-                  </a:txBody>
-                  <a:tcPr/>
-                </a:tc>
+                    </a:p>
+                  </a:txBody>
+                  <a:tcPr/>
+                </a:tc>
+                <a:extLst>
+                  <a:ext uri="{0D108BD9-81ED-4DB2-BD59-A6C34878D82A}">
+                    <a16:rowId xmlns:a16="http://schemas.microsoft.com/office/drawing/2014/main" val="10005"/>
+                  </a:ext>
+                </a:extLst>
               </a:tr>
             </a:tbl>
           </a:graphicData>
@@ -4665,13 +4739,6 @@
   <p:clrMapOvr>
     <a:masterClrMapping/>
   </p:clrMapOvr>
-  <p:timing>
-    <p:tnLst>
-      <p:par>
-        <p:cTn id="1" dur="indefinite" restart="never" nodeType="tmRoot"/>
-      </p:par>
-    </p:tnLst>
-  </p:timing>
 </p:sld>
 </file>
 
@@ -4762,7 +4829,13 @@
                 <a:tableStyleId>{5C22544A-7EE6-4342-B048-85BDC9FD1C3A}</a:tableStyleId>
               </a:tblPr>
               <a:tblGrid>
-                <a:gridCol w="10515600"/>
+                <a:gridCol w="10515600">
+                  <a:extLst>
+                    <a:ext uri="{9D8B030D-6E8A-4147-A177-3AD203B41FA5}">
+                      <a16:colId xmlns:a16="http://schemas.microsoft.com/office/drawing/2014/main" val="20000"/>
+                    </a:ext>
+                  </a:extLst>
+                </a:gridCol>
               </a:tblGrid>
               <a:tr h="370840">
                 <a:tc>
@@ -4787,37 +4860,42 @@
                         <a:defRPr/>
                       </a:pPr>
                       <a:r>
-                        <a:rPr lang="pt-BR" dirty="0" smtClean="0"/>
+                        <a:rPr lang="pt-BR" dirty="0"/>
                         <a:t>Soluções Encontradas para 30 caracteres da Palavra-Alvo (</a:t>
                       </a:r>
                       <a:r>
-                        <a:rPr lang="pt-BR" dirty="0" err="1" smtClean="0"/>
+                        <a:rPr lang="pt-BR" dirty="0" err="1"/>
                         <a:t>Random</a:t>
                       </a:r>
                       <a:r>
-                        <a:rPr lang="pt-BR" dirty="0" smtClean="0"/>
+                        <a:rPr lang="pt-BR" dirty="0"/>
                         <a:t> </a:t>
                       </a:r>
                       <a:r>
-                        <a:rPr lang="pt-BR" dirty="0" err="1" smtClean="0"/>
+                        <a:rPr lang="pt-BR" dirty="0" err="1"/>
                         <a:t>Walk</a:t>
                       </a:r>
                       <a:r>
-                        <a:rPr lang="pt-BR" dirty="0" smtClean="0"/>
+                        <a:rPr lang="pt-BR" dirty="0"/>
                         <a:t>,</a:t>
                       </a:r>
                       <a:r>
-                        <a:rPr lang="pt-BR" baseline="0" dirty="0" smtClean="0"/>
+                        <a:rPr lang="pt-BR" baseline="0" dirty="0"/>
                         <a:t> </a:t>
                       </a:r>
                       <a:r>
-                        <a:rPr lang="pt-BR" dirty="0" smtClean="0"/>
+                        <a:rPr lang="pt-BR" dirty="0"/>
                         <a:t>População 50)</a:t>
                       </a:r>
                     </a:p>
                   </a:txBody>
                   <a:tcPr/>
                 </a:tc>
+                <a:extLst>
+                  <a:ext uri="{0D108BD9-81ED-4DB2-BD59-A6C34878D82A}">
+                    <a16:rowId xmlns:a16="http://schemas.microsoft.com/office/drawing/2014/main" val="10000"/>
+                  </a:ext>
+                </a:extLst>
               </a:tr>
               <a:tr h="370840">
                 <a:tc>
@@ -4826,14 +4904,18 @@
                     <a:lstStyle/>
                     <a:p>
                       <a:r>
-                        <a:rPr lang="pt-BR" dirty="0" smtClean="0"/>
+                        <a:rPr lang="pt-BR" dirty="0"/>
                         <a:t>106.634, 63.878, 54.576, 62.442, 81.316, 105.466, 77.386, 95.453, 57.571, 88.146, 79.65, 117.936, 94.497, 64.972, 105.177, 65.55, 76.649, 99.733, 124.101, 74.866, 106.546, 83.006, 66.95, 57.065, 93.524, 120.854, 83.372, 78.896, 58.095, 74.496</a:t>
                       </a:r>
-                      <a:endParaRPr lang="pt-BR" dirty="0"/>
-                    </a:p>
-                  </a:txBody>
-                  <a:tcPr/>
-                </a:tc>
+                    </a:p>
+                  </a:txBody>
+                  <a:tcPr/>
+                </a:tc>
+                <a:extLst>
+                  <a:ext uri="{0D108BD9-81ED-4DB2-BD59-A6C34878D82A}">
+                    <a16:rowId xmlns:a16="http://schemas.microsoft.com/office/drawing/2014/main" val="10001"/>
+                  </a:ext>
+                </a:extLst>
               </a:tr>
               <a:tr h="370840">
                 <a:tc>
@@ -4842,14 +4924,18 @@
                     <a:lstStyle/>
                     <a:p>
                       <a:r>
-                        <a:rPr lang="pt-BR" dirty="0" smtClean="0"/>
+                        <a:rPr lang="pt-BR" dirty="0"/>
                         <a:t>57.357, 80.252, 59.239, 57.118, 77.752, 95.085, 53.859, 116.312, 88.829, 62.946, 84.214, 93.296, 75.999, 68.996, 70.222, 71.735, 93.969, 106.934, 122.18, 78.663, 115.984, 63.973, 72.394, 67.67, 74.813, 112.916, 83.602, 106.978, 94.12, 108.463</a:t>
                       </a:r>
-                      <a:endParaRPr lang="pt-BR" dirty="0"/>
-                    </a:p>
-                  </a:txBody>
-                  <a:tcPr/>
-                </a:tc>
+                    </a:p>
+                  </a:txBody>
+                  <a:tcPr/>
+                </a:tc>
+                <a:extLst>
+                  <a:ext uri="{0D108BD9-81ED-4DB2-BD59-A6C34878D82A}">
+                    <a16:rowId xmlns:a16="http://schemas.microsoft.com/office/drawing/2014/main" val="10002"/>
+                  </a:ext>
+                </a:extLst>
               </a:tr>
               <a:tr h="370840">
                 <a:tc>
@@ -4858,14 +4944,18 @@
                     <a:lstStyle/>
                     <a:p>
                       <a:r>
-                        <a:rPr lang="pt-BR" dirty="0" smtClean="0"/>
+                        <a:rPr lang="pt-BR" dirty="0"/>
                         <a:t>57.158, 72.32, 97.516, 55.823, 59.485, 122.269, 67.273, 97.19, 106.106, 84.882, 80.358, 103.732, 125.702, 68.313, 105.005, 82.672, 111.896, 109.501, 96.081, 126.351, 104.29, 114.379, 65.746, 56.133, 88.375, 121.211, 107.387, 92.294, 81.8, 109.884</a:t>
                       </a:r>
-                      <a:endParaRPr lang="pt-BR" dirty="0"/>
-                    </a:p>
-                  </a:txBody>
-                  <a:tcPr/>
-                </a:tc>
+                    </a:p>
+                  </a:txBody>
+                  <a:tcPr/>
+                </a:tc>
+                <a:extLst>
+                  <a:ext uri="{0D108BD9-81ED-4DB2-BD59-A6C34878D82A}">
+                    <a16:rowId xmlns:a16="http://schemas.microsoft.com/office/drawing/2014/main" val="10003"/>
+                  </a:ext>
+                </a:extLst>
               </a:tr>
               <a:tr h="370840">
                 <a:tc>
@@ -4874,14 +4964,18 @@
                     <a:lstStyle/>
                     <a:p>
                       <a:r>
-                        <a:rPr lang="pt-BR" dirty="0" smtClean="0"/>
+                        <a:rPr lang="pt-BR" dirty="0"/>
                         <a:t>51.959, 70.19, 70.624, 83.522, 61.779, 108.659, 87.156, 121.424, 90.41, 91.734, 63.514, 90.882, 100.458, 66.006, 93.542, 104.866, 118.85, 101.281, 106.622, 65.657, 97.692, 121.827, 51.826, 73.17, 91.129, 71.66, 81.226, 70.979, 65.827, 112.021</a:t>
                       </a:r>
-                      <a:endParaRPr lang="pt-BR" dirty="0"/>
-                    </a:p>
-                  </a:txBody>
-                  <a:tcPr/>
-                </a:tc>
+                    </a:p>
+                  </a:txBody>
+                  <a:tcPr/>
+                </a:tc>
+                <a:extLst>
+                  <a:ext uri="{0D108BD9-81ED-4DB2-BD59-A6C34878D82A}">
+                    <a16:rowId xmlns:a16="http://schemas.microsoft.com/office/drawing/2014/main" val="10004"/>
+                  </a:ext>
+                </a:extLst>
               </a:tr>
               <a:tr h="370840">
                 <a:tc>
@@ -4890,14 +4984,18 @@
                     <a:lstStyle/>
                     <a:p>
                       <a:r>
-                        <a:rPr lang="pt-BR" dirty="0" smtClean="0"/>
+                        <a:rPr lang="pt-BR" dirty="0"/>
                         <a:t>59.977, 53.541, 71.266, 67.213, 80.03, 93.373, 85.794, 112.594, 60.689, 72.091, 95.05, 107.652, 124.238, 65.406, 73.993, 90.968, 79.877, 114.053, 99.002, 50.866, 108.439, 116.294, 115.043, 72.994, 87.748, 114.328, 74.958, 74.314, 79.304, 108.899</a:t>
                       </a:r>
-                      <a:endParaRPr lang="pt-BR" dirty="0"/>
-                    </a:p>
-                  </a:txBody>
-                  <a:tcPr/>
-                </a:tc>
+                    </a:p>
+                  </a:txBody>
+                  <a:tcPr/>
+                </a:tc>
+                <a:extLst>
+                  <a:ext uri="{0D108BD9-81ED-4DB2-BD59-A6C34878D82A}">
+                    <a16:rowId xmlns:a16="http://schemas.microsoft.com/office/drawing/2014/main" val="10005"/>
+                  </a:ext>
+                </a:extLst>
               </a:tr>
             </a:tbl>
           </a:graphicData>
@@ -4908,13 +5006,6 @@
   <p:clrMapOvr>
     <a:masterClrMapping/>
   </p:clrMapOvr>
-  <p:timing>
-    <p:tnLst>
-      <p:par>
-        <p:cTn id="1" dur="indefinite" restart="never" nodeType="tmRoot"/>
-      </p:par>
-    </p:tnLst>
-  </p:timing>
 </p:sld>
 </file>
 
@@ -4952,10 +5043,9 @@
           <a:p>
             <a:pPr algn="ctr"/>
             <a:r>
-              <a:rPr lang="pt-BR" dirty="0" smtClean="0"/>
+              <a:rPr lang="pt-BR" dirty="0"/>
               <a:t>Agenda</a:t>
             </a:r>
-            <a:endParaRPr lang="pt-BR" dirty="0"/>
           </a:p>
         </p:txBody>
       </p:sp>
@@ -4975,64 +5065,63 @@
           <a:lstStyle/>
           <a:p>
             <a:r>
-              <a:rPr lang="pt-BR" dirty="0" smtClean="0"/>
+              <a:rPr lang="pt-BR" dirty="0"/>
               <a:t>Introdução</a:t>
             </a:r>
           </a:p>
           <a:p>
             <a:r>
-              <a:rPr lang="pt-BR" dirty="0" smtClean="0"/>
+              <a:rPr lang="pt-BR" dirty="0"/>
               <a:t>Objetivo</a:t>
             </a:r>
           </a:p>
           <a:p>
             <a:r>
-              <a:rPr lang="pt-BR" dirty="0" smtClean="0"/>
+              <a:rPr lang="pt-BR" dirty="0"/>
               <a:t>Diagramas UML</a:t>
             </a:r>
           </a:p>
           <a:p>
             <a:r>
-              <a:rPr lang="pt-BR" dirty="0" smtClean="0"/>
+              <a:rPr lang="pt-BR" dirty="0"/>
               <a:t>Algoritmo Genético </a:t>
             </a:r>
             <a:r>
-              <a:rPr lang="pt-BR" dirty="0" err="1" smtClean="0"/>
+              <a:rPr lang="pt-BR" dirty="0" err="1"/>
               <a:t>Vs</a:t>
             </a:r>
             <a:r>
-              <a:rPr lang="pt-BR" dirty="0" smtClean="0"/>
+              <a:rPr lang="pt-BR" dirty="0"/>
               <a:t> Caminhada Aleatória (</a:t>
             </a:r>
             <a:r>
-              <a:rPr lang="pt-BR" dirty="0" err="1" smtClean="0"/>
+              <a:rPr lang="pt-BR" dirty="0" err="1"/>
               <a:t>Random</a:t>
             </a:r>
             <a:r>
-              <a:rPr lang="pt-BR" dirty="0" smtClean="0"/>
+              <a:rPr lang="pt-BR" dirty="0"/>
               <a:t> </a:t>
             </a:r>
             <a:r>
-              <a:rPr lang="pt-BR" dirty="0" err="1" smtClean="0"/>
+              <a:rPr lang="pt-BR" dirty="0" err="1"/>
               <a:t>Walk</a:t>
             </a:r>
             <a:r>
-              <a:rPr lang="pt-BR" dirty="0" smtClean="0"/>
+              <a:rPr lang="pt-BR" dirty="0"/>
               <a:t>)</a:t>
             </a:r>
           </a:p>
           <a:p>
             <a:r>
-              <a:rPr lang="pt-BR" dirty="0" smtClean="0"/>
+              <a:rPr lang="pt-BR" dirty="0"/>
               <a:t>Conclusão</a:t>
             </a:r>
           </a:p>
           <a:p>
             <a:r>
-              <a:rPr lang="pt-BR" dirty="0" smtClean="0"/>
+              <a:rPr lang="pt-BR" dirty="0"/>
               <a:t>Agradecimento</a:t>
             </a:r>
-            <a:endParaRPr lang="pt-BR" dirty="0"/>
           </a:p>
         </p:txBody>
       </p:sp>
@@ -5041,13 +5130,6 @@
   <p:clrMapOvr>
     <a:masterClrMapping/>
   </p:clrMapOvr>
-  <p:timing>
-    <p:tnLst>
-      <p:par>
-        <p:cTn id="1" dur="indefinite" restart="never" nodeType="tmRoot"/>
-      </p:par>
-    </p:tnLst>
-  </p:timing>
 </p:sld>
 </file>
 
@@ -5146,13 +5228,6 @@
   <p:clrMapOvr>
     <a:masterClrMapping/>
   </p:clrMapOvr>
-  <p:timing>
-    <p:tnLst>
-      <p:par>
-        <p:cTn id="1" dur="indefinite" restart="never" nodeType="tmRoot"/>
-      </p:par>
-    </p:tnLst>
-  </p:timing>
 </p:sld>
 </file>
 
@@ -5210,7 +5285,7 @@
               <a:t> </a:t>
             </a:r>
             <a:r>
-              <a:rPr lang="pt-BR" dirty="0" err="1" smtClean="0"/>
+              <a:rPr lang="pt-BR" dirty="0" err="1"/>
               <a:t>Walk</a:t>
             </a:r>
             <a:endParaRPr lang="pt-BR" dirty="0"/>
@@ -5251,13 +5326,6 @@
   <p:clrMapOvr>
     <a:masterClrMapping/>
   </p:clrMapOvr>
-  <p:timing>
-    <p:tnLst>
-      <p:par>
-        <p:cTn id="1" dur="indefinite" restart="never" nodeType="tmRoot"/>
-      </p:par>
-    </p:tnLst>
-  </p:timing>
 </p:sld>
 </file>
 
@@ -5315,7 +5383,7 @@
               <a:t> </a:t>
             </a:r>
             <a:r>
-              <a:rPr lang="pt-BR" dirty="0" err="1" smtClean="0"/>
+              <a:rPr lang="pt-BR" dirty="0" err="1"/>
               <a:t>Walk</a:t>
             </a:r>
             <a:endParaRPr lang="pt-BR" dirty="0"/>
@@ -5356,13 +5424,6 @@
   <p:clrMapOvr>
     <a:masterClrMapping/>
   </p:clrMapOvr>
-  <p:timing>
-    <p:tnLst>
-      <p:par>
-        <p:cTn id="1" dur="indefinite" restart="never" nodeType="tmRoot"/>
-      </p:par>
-    </p:tnLst>
-  </p:timing>
 </p:sld>
 </file>
 
@@ -5461,13 +5522,6 @@
   <p:clrMapOvr>
     <a:masterClrMapping/>
   </p:clrMapOvr>
-  <p:timing>
-    <p:tnLst>
-      <p:par>
-        <p:cTn id="1" dur="indefinite" restart="never" nodeType="tmRoot"/>
-      </p:par>
-    </p:tnLst>
-  </p:timing>
 </p:sld>
 </file>
 
@@ -5566,13 +5620,6 @@
   <p:clrMapOvr>
     <a:masterClrMapping/>
   </p:clrMapOvr>
-  <p:timing>
-    <p:tnLst>
-      <p:par>
-        <p:cTn id="1" dur="indefinite" restart="never" nodeType="tmRoot"/>
-      </p:par>
-    </p:tnLst>
-  </p:timing>
 </p:sld>
 </file>
 
@@ -5658,7 +5705,13 @@
                 <a:tableStyleId>{5C22544A-7EE6-4342-B048-85BDC9FD1C3A}</a:tableStyleId>
               </a:tblPr>
               <a:tblGrid>
-                <a:gridCol w="10515600"/>
+                <a:gridCol w="10515600">
+                  <a:extLst>
+                    <a:ext uri="{9D8B030D-6E8A-4147-A177-3AD203B41FA5}">
+                      <a16:colId xmlns:a16="http://schemas.microsoft.com/office/drawing/2014/main" val="20000"/>
+                    </a:ext>
+                  </a:extLst>
+                </a:gridCol>
               </a:tblGrid>
               <a:tr h="370840">
                 <a:tc>
@@ -5668,14 +5721,18 @@
                     <a:p>
                       <a:pPr algn="ctr"/>
                       <a:r>
-                        <a:rPr lang="pt-BR" dirty="0" smtClean="0"/>
+                        <a:rPr lang="pt-BR" dirty="0"/>
                         <a:t>Soluções Encontradas para 10 caracteres da Palavra-Alvo (AG, População 100)</a:t>
                       </a:r>
-                      <a:endParaRPr lang="pt-BR" dirty="0"/>
-                    </a:p>
-                  </a:txBody>
-                  <a:tcPr/>
-                </a:tc>
+                    </a:p>
+                  </a:txBody>
+                  <a:tcPr/>
+                </a:tc>
+                <a:extLst>
+                  <a:ext uri="{0D108BD9-81ED-4DB2-BD59-A6C34878D82A}">
+                    <a16:rowId xmlns:a16="http://schemas.microsoft.com/office/drawing/2014/main" val="10000"/>
+                  </a:ext>
+                </a:extLst>
               </a:tr>
               <a:tr h="370840">
                 <a:tc>
@@ -5685,14 +5742,18 @@
                     <a:p>
                       <a:pPr algn="ctr"/>
                       <a:r>
-                        <a:rPr lang="pt-BR" dirty="0" smtClean="0"/>
+                        <a:rPr lang="pt-BR" dirty="0"/>
                         <a:t>52.547, 72.15, 53.694, 57.771, 115.88, 105.59, 75.368, 126.02, 52.756, 85.1</a:t>
                       </a:r>
-                      <a:endParaRPr lang="pt-BR" dirty="0"/>
-                    </a:p>
-                  </a:txBody>
-                  <a:tcPr/>
-                </a:tc>
+                    </a:p>
+                  </a:txBody>
+                  <a:tcPr/>
+                </a:tc>
+                <a:extLst>
+                  <a:ext uri="{0D108BD9-81ED-4DB2-BD59-A6C34878D82A}">
+                    <a16:rowId xmlns:a16="http://schemas.microsoft.com/office/drawing/2014/main" val="10001"/>
+                  </a:ext>
+                </a:extLst>
               </a:tr>
               <a:tr h="370840">
                 <a:tc>
@@ -5702,14 +5763,18 @@
                     <a:p>
                       <a:pPr algn="ctr"/>
                       <a:r>
-                        <a:rPr lang="pt-BR" dirty="0" smtClean="0"/>
+                        <a:rPr lang="pt-BR" dirty="0"/>
                         <a:t>52.547, 72.15, 53.694, 57.771, 115.88, 105.59, 75.368, 126.02, 52.756, 85.1</a:t>
                       </a:r>
-                      <a:endParaRPr lang="pt-BR" dirty="0"/>
-                    </a:p>
-                  </a:txBody>
-                  <a:tcPr/>
-                </a:tc>
+                    </a:p>
+                  </a:txBody>
+                  <a:tcPr/>
+                </a:tc>
+                <a:extLst>
+                  <a:ext uri="{0D108BD9-81ED-4DB2-BD59-A6C34878D82A}">
+                    <a16:rowId xmlns:a16="http://schemas.microsoft.com/office/drawing/2014/main" val="10002"/>
+                  </a:ext>
+                </a:extLst>
               </a:tr>
               <a:tr h="370840">
                 <a:tc>
@@ -5719,14 +5784,18 @@
                     <a:p>
                       <a:pPr algn="ctr"/>
                       <a:r>
-                        <a:rPr lang="pt-BR" dirty="0" smtClean="0"/>
+                        <a:rPr lang="pt-BR" dirty="0"/>
                         <a:t>52.547, 72.15, 53.694, 57.771, 115.88, 105.59, 75.368, 126.02, 52.756, 85.1</a:t>
                       </a:r>
-                      <a:endParaRPr lang="pt-BR" dirty="0"/>
-                    </a:p>
-                  </a:txBody>
-                  <a:tcPr/>
-                </a:tc>
+                    </a:p>
+                  </a:txBody>
+                  <a:tcPr/>
+                </a:tc>
+                <a:extLst>
+                  <a:ext uri="{0D108BD9-81ED-4DB2-BD59-A6C34878D82A}">
+                    <a16:rowId xmlns:a16="http://schemas.microsoft.com/office/drawing/2014/main" val="10003"/>
+                  </a:ext>
+                </a:extLst>
               </a:tr>
               <a:tr h="370840">
                 <a:tc>
@@ -5736,14 +5805,18 @@
                     <a:p>
                       <a:pPr algn="ctr"/>
                       <a:r>
-                        <a:rPr lang="pt-BR" dirty="0" smtClean="0"/>
+                        <a:rPr lang="pt-BR" dirty="0"/>
                         <a:t>52.547, 72.15, 53.694, 57.771, 115.88, 105.59, 75.368, 126.02, 52.756, 85.1</a:t>
                       </a:r>
-                      <a:endParaRPr lang="pt-BR" dirty="0"/>
-                    </a:p>
-                  </a:txBody>
-                  <a:tcPr/>
-                </a:tc>
+                    </a:p>
+                  </a:txBody>
+                  <a:tcPr/>
+                </a:tc>
+                <a:extLst>
+                  <a:ext uri="{0D108BD9-81ED-4DB2-BD59-A6C34878D82A}">
+                    <a16:rowId xmlns:a16="http://schemas.microsoft.com/office/drawing/2014/main" val="10004"/>
+                  </a:ext>
+                </a:extLst>
               </a:tr>
               <a:tr h="370840">
                 <a:tc>
@@ -5753,14 +5826,18 @@
                     <a:p>
                       <a:pPr algn="ctr"/>
                       <a:r>
-                        <a:rPr lang="pt-BR" dirty="0" smtClean="0"/>
+                        <a:rPr lang="pt-BR" dirty="0"/>
                         <a:t>52.547, 72.15, 53.694, 57.771, 115.88, 105.59, 75.368, 126.02, 52.756, 85.1</a:t>
                       </a:r>
-                      <a:endParaRPr lang="pt-BR" dirty="0"/>
-                    </a:p>
-                  </a:txBody>
-                  <a:tcPr/>
-                </a:tc>
+                    </a:p>
+                  </a:txBody>
+                  <a:tcPr/>
+                </a:tc>
+                <a:extLst>
+                  <a:ext uri="{0D108BD9-81ED-4DB2-BD59-A6C34878D82A}">
+                    <a16:rowId xmlns:a16="http://schemas.microsoft.com/office/drawing/2014/main" val="10005"/>
+                  </a:ext>
+                </a:extLst>
               </a:tr>
             </a:tbl>
           </a:graphicData>
@@ -5771,13 +5848,6 @@
   <p:clrMapOvr>
     <a:masterClrMapping/>
   </p:clrMapOvr>
-  <p:timing>
-    <p:tnLst>
-      <p:par>
-        <p:cTn id="1" dur="indefinite" restart="never" nodeType="tmRoot"/>
-      </p:par>
-    </p:tnLst>
-  </p:timing>
 </p:sld>
 </file>
 
@@ -5863,7 +5933,13 @@
                 <a:tableStyleId>{5C22544A-7EE6-4342-B048-85BDC9FD1C3A}</a:tableStyleId>
               </a:tblPr>
               <a:tblGrid>
-                <a:gridCol w="10515600"/>
+                <a:gridCol w="10515600">
+                  <a:extLst>
+                    <a:ext uri="{9D8B030D-6E8A-4147-A177-3AD203B41FA5}">
+                      <a16:colId xmlns:a16="http://schemas.microsoft.com/office/drawing/2014/main" val="20000"/>
+                    </a:ext>
+                  </a:extLst>
+                </a:gridCol>
               </a:tblGrid>
               <a:tr h="370840">
                 <a:tc>
@@ -5873,30 +5949,34 @@
                     <a:p>
                       <a:pPr algn="ctr"/>
                       <a:r>
-                        <a:rPr lang="pt-BR" dirty="0" smtClean="0"/>
+                        <a:rPr lang="pt-BR" dirty="0"/>
                         <a:t>Soluções Encontradas para 10 caracteres da Palavra-Alvo (</a:t>
                       </a:r>
                       <a:r>
-                        <a:rPr lang="pt-BR" dirty="0" err="1" smtClean="0"/>
+                        <a:rPr lang="pt-BR" dirty="0" err="1"/>
                         <a:t>Random</a:t>
                       </a:r>
                       <a:r>
-                        <a:rPr lang="pt-BR" dirty="0" smtClean="0"/>
+                        <a:rPr lang="pt-BR" dirty="0"/>
                         <a:t> </a:t>
                       </a:r>
                       <a:r>
-                        <a:rPr lang="pt-BR" dirty="0" err="1" smtClean="0"/>
+                        <a:rPr lang="pt-BR" dirty="0" err="1"/>
                         <a:t>Walk</a:t>
                       </a:r>
                       <a:r>
-                        <a:rPr lang="pt-BR" dirty="0" smtClean="0"/>
+                        <a:rPr lang="pt-BR" dirty="0"/>
                         <a:t>, População 100)</a:t>
                       </a:r>
-                      <a:endParaRPr lang="pt-BR" dirty="0"/>
-                    </a:p>
-                  </a:txBody>
-                  <a:tcPr/>
-                </a:tc>
+                    </a:p>
+                  </a:txBody>
+                  <a:tcPr/>
+                </a:tc>
+                <a:extLst>
+                  <a:ext uri="{0D108BD9-81ED-4DB2-BD59-A6C34878D82A}">
+                    <a16:rowId xmlns:a16="http://schemas.microsoft.com/office/drawing/2014/main" val="10000"/>
+                  </a:ext>
+                </a:extLst>
               </a:tr>
               <a:tr h="370840">
                 <a:tc>
@@ -5906,14 +5986,18 @@
                     <a:p>
                       <a:pPr algn="ctr"/>
                       <a:r>
-                        <a:rPr lang="pt-BR" dirty="0" smtClean="0"/>
+                        <a:rPr lang="pt-BR" dirty="0"/>
                         <a:t>53.338, 75.327, 56.934, 57.54, 117.423, 105.382, 71.132, 93.331, 74.82, 84.526</a:t>
                       </a:r>
-                      <a:endParaRPr lang="pt-BR" dirty="0"/>
-                    </a:p>
-                  </a:txBody>
-                  <a:tcPr/>
-                </a:tc>
+                    </a:p>
+                  </a:txBody>
+                  <a:tcPr/>
+                </a:tc>
+                <a:extLst>
+                  <a:ext uri="{0D108BD9-81ED-4DB2-BD59-A6C34878D82A}">
+                    <a16:rowId xmlns:a16="http://schemas.microsoft.com/office/drawing/2014/main" val="10001"/>
+                  </a:ext>
+                </a:extLst>
               </a:tr>
               <a:tr h="370840">
                 <a:tc>
@@ -5923,14 +6007,18 @@
                     <a:p>
                       <a:pPr algn="ctr"/>
                       <a:r>
-                        <a:rPr lang="pt-BR" dirty="0" smtClean="0"/>
+                        <a:rPr lang="pt-BR" dirty="0"/>
                         <a:t>52.912, 75.692, 69.053, 53.842, 98.087, 96.809, 83.986, 118.304, 51.746, 86.122</a:t>
                       </a:r>
-                      <a:endParaRPr lang="pt-BR" dirty="0"/>
-                    </a:p>
-                  </a:txBody>
-                  <a:tcPr/>
-                </a:tc>
+                    </a:p>
+                  </a:txBody>
+                  <a:tcPr/>
+                </a:tc>
+                <a:extLst>
+                  <a:ext uri="{0D108BD9-81ED-4DB2-BD59-A6C34878D82A}">
+                    <a16:rowId xmlns:a16="http://schemas.microsoft.com/office/drawing/2014/main" val="10002"/>
+                  </a:ext>
+                </a:extLst>
               </a:tr>
               <a:tr h="370840">
                 <a:tc>
@@ -5940,14 +6028,18 @@
                     <a:p>
                       <a:pPr algn="ctr"/>
                       <a:r>
-                        <a:rPr lang="pt-BR" dirty="0" smtClean="0"/>
+                        <a:rPr lang="pt-BR" dirty="0"/>
                         <a:t>56.303, 72.131, 55.578, 52.494, 118.347, 108.81, 53.755, 119.686, 52.315, 98.874</a:t>
                       </a:r>
-                      <a:endParaRPr lang="pt-BR" dirty="0"/>
-                    </a:p>
-                  </a:txBody>
-                  <a:tcPr/>
-                </a:tc>
+                    </a:p>
+                  </a:txBody>
+                  <a:tcPr/>
+                </a:tc>
+                <a:extLst>
+                  <a:ext uri="{0D108BD9-81ED-4DB2-BD59-A6C34878D82A}">
+                    <a16:rowId xmlns:a16="http://schemas.microsoft.com/office/drawing/2014/main" val="10003"/>
+                  </a:ext>
+                </a:extLst>
               </a:tr>
               <a:tr h="370840">
                 <a:tc>
@@ -5957,14 +6049,18 @@
                     <a:p>
                       <a:pPr algn="ctr"/>
                       <a:r>
-                        <a:rPr lang="pt-BR" dirty="0" smtClean="0"/>
+                        <a:rPr lang="pt-BR" dirty="0"/>
                         <a:t>50.937, 62.859, 53.093, 58.882, 113.311, 107.515, 75.952, 114.414, 68.207, 110.226</a:t>
                       </a:r>
-                      <a:endParaRPr lang="pt-BR" dirty="0"/>
-                    </a:p>
-                  </a:txBody>
-                  <a:tcPr/>
-                </a:tc>
+                    </a:p>
+                  </a:txBody>
+                  <a:tcPr/>
+                </a:tc>
+                <a:extLst>
+                  <a:ext uri="{0D108BD9-81ED-4DB2-BD59-A6C34878D82A}">
+                    <a16:rowId xmlns:a16="http://schemas.microsoft.com/office/drawing/2014/main" val="10004"/>
+                  </a:ext>
+                </a:extLst>
               </a:tr>
               <a:tr h="370840">
                 <a:tc>
@@ -5974,14 +6070,18 @@
                     <a:p>
                       <a:pPr algn="ctr"/>
                       <a:r>
-                        <a:rPr lang="pt-BR" dirty="0" smtClean="0"/>
+                        <a:rPr lang="pt-BR" dirty="0"/>
                         <a:t>72.029, 81.588, 54.653, 53.272, 118.699, 102.322, 74.358, 108.43, 57.013, 74.891</a:t>
                       </a:r>
-                      <a:endParaRPr lang="pt-BR" dirty="0"/>
-                    </a:p>
-                  </a:txBody>
-                  <a:tcPr/>
-                </a:tc>
+                    </a:p>
+                  </a:txBody>
+                  <a:tcPr/>
+                </a:tc>
+                <a:extLst>
+                  <a:ext uri="{0D108BD9-81ED-4DB2-BD59-A6C34878D82A}">
+                    <a16:rowId xmlns:a16="http://schemas.microsoft.com/office/drawing/2014/main" val="10005"/>
+                  </a:ext>
+                </a:extLst>
               </a:tr>
             </a:tbl>
           </a:graphicData>
@@ -5992,13 +6092,6 @@
   <p:clrMapOvr>
     <a:masterClrMapping/>
   </p:clrMapOvr>
-  <p:timing>
-    <p:tnLst>
-      <p:par>
-        <p:cTn id="1" dur="indefinite" restart="never" nodeType="tmRoot"/>
-      </p:par>
-    </p:tnLst>
-  </p:timing>
 </p:sld>
 </file>
 
@@ -6097,13 +6190,6 @@
   <p:clrMapOvr>
     <a:masterClrMapping/>
   </p:clrMapOvr>
-  <p:timing>
-    <p:tnLst>
-      <p:par>
-        <p:cTn id="1" dur="indefinite" restart="never" nodeType="tmRoot"/>
-      </p:par>
-    </p:tnLst>
-  </p:timing>
 </p:sld>
 </file>
 
@@ -6202,13 +6288,6 @@
   <p:clrMapOvr>
     <a:masterClrMapping/>
   </p:clrMapOvr>
-  <p:timing>
-    <p:tnLst>
-      <p:par>
-        <p:cTn id="1" dur="indefinite" restart="never" nodeType="tmRoot"/>
-      </p:par>
-    </p:tnLst>
-  </p:timing>
 </p:sld>
 </file>
 
@@ -6294,7 +6373,13 @@
                 <a:tableStyleId>{5C22544A-7EE6-4342-B048-85BDC9FD1C3A}</a:tableStyleId>
               </a:tblPr>
               <a:tblGrid>
-                <a:gridCol w="10515600"/>
+                <a:gridCol w="10515600">
+                  <a:extLst>
+                    <a:ext uri="{9D8B030D-6E8A-4147-A177-3AD203B41FA5}">
+                      <a16:colId xmlns:a16="http://schemas.microsoft.com/office/drawing/2014/main" val="20000"/>
+                    </a:ext>
+                  </a:extLst>
+                </a:gridCol>
               </a:tblGrid>
               <a:tr h="370840">
                 <a:tc>
@@ -6319,21 +6404,26 @@
                         <a:defRPr/>
                       </a:pPr>
                       <a:r>
-                        <a:rPr lang="pt-BR" dirty="0" smtClean="0"/>
+                        <a:rPr lang="pt-BR" dirty="0"/>
                         <a:t>Soluções Encontradas para 20 caracteres da Palavra-Alvo (AG,</a:t>
                       </a:r>
                       <a:r>
-                        <a:rPr lang="pt-BR" baseline="0" dirty="0" smtClean="0"/>
+                        <a:rPr lang="pt-BR" baseline="0" dirty="0"/>
                         <a:t> </a:t>
                       </a:r>
                       <a:r>
-                        <a:rPr lang="pt-BR" dirty="0" smtClean="0"/>
+                        <a:rPr lang="pt-BR" dirty="0"/>
                         <a:t>População 100)</a:t>
                       </a:r>
                     </a:p>
                   </a:txBody>
                   <a:tcPr/>
                 </a:tc>
+                <a:extLst>
+                  <a:ext uri="{0D108BD9-81ED-4DB2-BD59-A6C34878D82A}">
+                    <a16:rowId xmlns:a16="http://schemas.microsoft.com/office/drawing/2014/main" val="10000"/>
+                  </a:ext>
+                </a:extLst>
               </a:tr>
               <a:tr h="370840">
                 <a:tc>
@@ -6342,14 +6432,18 @@
                     <a:lstStyle/>
                     <a:p>
                       <a:r>
-                        <a:rPr lang="pt-BR" dirty="0" smtClean="0"/>
+                        <a:rPr lang="pt-BR" dirty="0"/>
                         <a:t>52.547, 72.15, 53.694, 57.771, 115.88, 105.59, 75.368, 126.02, 52.756, 85.1, 80.525, 111.24, 113.62, 64.95, 89.181, 85.647, 101.71, 106.75, 110.37, 72.082</a:t>
                       </a:r>
-                      <a:endParaRPr lang="pt-BR" dirty="0"/>
-                    </a:p>
-                  </a:txBody>
-                  <a:tcPr/>
-                </a:tc>
+                    </a:p>
+                  </a:txBody>
+                  <a:tcPr/>
+                </a:tc>
+                <a:extLst>
+                  <a:ext uri="{0D108BD9-81ED-4DB2-BD59-A6C34878D82A}">
+                    <a16:rowId xmlns:a16="http://schemas.microsoft.com/office/drawing/2014/main" val="10001"/>
+                  </a:ext>
+                </a:extLst>
               </a:tr>
               <a:tr h="370840">
                 <a:tc>
@@ -6358,14 +6452,18 @@
                     <a:lstStyle/>
                     <a:p>
                       <a:r>
-                        <a:rPr lang="pt-BR" dirty="0" smtClean="0"/>
+                        <a:rPr lang="pt-BR" dirty="0"/>
                         <a:t>52.547, 72.15, 53.694, 57.771, 115.88, 105.59, 75.368, 126.02, 52.756, 85.1, 80.525, 111.24, 113.62, 64.95, 89.181, 85.647, 101.71, 106.75, 110.37, 72.082</a:t>
                       </a:r>
-                      <a:endParaRPr lang="pt-BR" dirty="0"/>
-                    </a:p>
-                  </a:txBody>
-                  <a:tcPr/>
-                </a:tc>
+                    </a:p>
+                  </a:txBody>
+                  <a:tcPr/>
+                </a:tc>
+                <a:extLst>
+                  <a:ext uri="{0D108BD9-81ED-4DB2-BD59-A6C34878D82A}">
+                    <a16:rowId xmlns:a16="http://schemas.microsoft.com/office/drawing/2014/main" val="10002"/>
+                  </a:ext>
+                </a:extLst>
               </a:tr>
               <a:tr h="370840">
                 <a:tc>
@@ -6374,14 +6472,18 @@
                     <a:lstStyle/>
                     <a:p>
                       <a:r>
-                        <a:rPr lang="pt-BR" dirty="0" smtClean="0"/>
+                        <a:rPr lang="pt-BR" dirty="0"/>
                         <a:t>52.547, 72.15, 53.694, 57.771, 115.88, 105.59, 75.368, 126.02, 52.756, 85.1, 80.525, 111.24, 113.62, 64.95, 89.181, 85.647, 101.71, 106.75, 110.37, 72.082</a:t>
                       </a:r>
-                      <a:endParaRPr lang="pt-BR" dirty="0"/>
-                    </a:p>
-                  </a:txBody>
-                  <a:tcPr/>
-                </a:tc>
+                    </a:p>
+                  </a:txBody>
+                  <a:tcPr/>
+                </a:tc>
+                <a:extLst>
+                  <a:ext uri="{0D108BD9-81ED-4DB2-BD59-A6C34878D82A}">
+                    <a16:rowId xmlns:a16="http://schemas.microsoft.com/office/drawing/2014/main" val="10003"/>
+                  </a:ext>
+                </a:extLst>
               </a:tr>
               <a:tr h="370840">
                 <a:tc>
@@ -6390,14 +6492,18 @@
                     <a:lstStyle/>
                     <a:p>
                       <a:r>
-                        <a:rPr lang="pt-BR" dirty="0" smtClean="0"/>
+                        <a:rPr lang="pt-BR" dirty="0"/>
                         <a:t>52.547, 72.15, 53.694, 57.771, 115.88, 105.59, 75.368, 126.02, 52.756, 85.1, 80.525, 111.24, 113.62, 64.95, 89.181, 85.647, 101.71, 106.75, 110.37, 72.082</a:t>
                       </a:r>
-                      <a:endParaRPr lang="pt-BR" dirty="0"/>
-                    </a:p>
-                  </a:txBody>
-                  <a:tcPr/>
-                </a:tc>
+                    </a:p>
+                  </a:txBody>
+                  <a:tcPr/>
+                </a:tc>
+                <a:extLst>
+                  <a:ext uri="{0D108BD9-81ED-4DB2-BD59-A6C34878D82A}">
+                    <a16:rowId xmlns:a16="http://schemas.microsoft.com/office/drawing/2014/main" val="10004"/>
+                  </a:ext>
+                </a:extLst>
               </a:tr>
               <a:tr h="370840">
                 <a:tc>
@@ -6406,14 +6512,18 @@
                     <a:lstStyle/>
                     <a:p>
                       <a:r>
-                        <a:rPr lang="pt-BR" dirty="0" smtClean="0"/>
+                        <a:rPr lang="pt-BR" dirty="0"/>
                         <a:t>52.547, 72.15, 53.694, 57.771, 115.88, 105.59, 75.368, 126.02, 52.756, 85.1, 80.525, 111.24, 113.62, 64.95, 89.181, 85.647, 101.71, 106.75, 110.37, 72.082</a:t>
                       </a:r>
-                      <a:endParaRPr lang="pt-BR" dirty="0"/>
-                    </a:p>
-                  </a:txBody>
-                  <a:tcPr/>
-                </a:tc>
+                    </a:p>
+                  </a:txBody>
+                  <a:tcPr/>
+                </a:tc>
+                <a:extLst>
+                  <a:ext uri="{0D108BD9-81ED-4DB2-BD59-A6C34878D82A}">
+                    <a16:rowId xmlns:a16="http://schemas.microsoft.com/office/drawing/2014/main" val="10005"/>
+                  </a:ext>
+                </a:extLst>
               </a:tr>
             </a:tbl>
           </a:graphicData>
@@ -6424,13 +6534,6 @@
   <p:clrMapOvr>
     <a:masterClrMapping/>
   </p:clrMapOvr>
-  <p:timing>
-    <p:tnLst>
-      <p:par>
-        <p:cTn id="1" dur="indefinite" restart="never" nodeType="tmRoot"/>
-      </p:par>
-    </p:tnLst>
-  </p:timing>
 </p:sld>
 </file>
 
@@ -6468,10 +6571,9 @@
           <a:p>
             <a:pPr algn="ctr"/>
             <a:r>
-              <a:rPr lang="pt-BR" dirty="0" smtClean="0"/>
+              <a:rPr lang="pt-BR" dirty="0"/>
               <a:t>Introdução</a:t>
             </a:r>
-            <a:endParaRPr lang="pt-BR" dirty="0"/>
           </a:p>
         </p:txBody>
       </p:sp>
@@ -6492,17 +6594,16 @@
           <a:p>
             <a:pPr algn="just"/>
             <a:r>
-              <a:rPr lang="pt-BR" dirty="0" smtClean="0"/>
+              <a:rPr lang="pt-BR" dirty="0"/>
               <a:t>Este trabalho tem a função de desenvolver um arcabouço para o Algoritmo Genético (AG).</a:t>
             </a:r>
           </a:p>
           <a:p>
             <a:pPr algn="just"/>
             <a:r>
-              <a:rPr lang="pt-BR" dirty="0" smtClean="0"/>
+              <a:rPr lang="pt-BR" dirty="0"/>
               <a:t>Um algoritmo de Caminhada Aleatória também é desenvolvido para fins de comparação com o desempenho do AG.</a:t>
             </a:r>
-            <a:endParaRPr lang="pt-BR" dirty="0"/>
           </a:p>
         </p:txBody>
       </p:sp>
@@ -6511,13 +6612,6 @@
   <p:clrMapOvr>
     <a:masterClrMapping/>
   </p:clrMapOvr>
-  <p:timing>
-    <p:tnLst>
-      <p:par>
-        <p:cTn id="1" dur="indefinite" restart="never" nodeType="tmRoot"/>
-      </p:par>
-    </p:tnLst>
-  </p:timing>
 </p:sld>
 </file>
 
@@ -6603,7 +6697,13 @@
                 <a:tableStyleId>{5C22544A-7EE6-4342-B048-85BDC9FD1C3A}</a:tableStyleId>
               </a:tblPr>
               <a:tblGrid>
-                <a:gridCol w="10515600"/>
+                <a:gridCol w="10515600">
+                  <a:extLst>
+                    <a:ext uri="{9D8B030D-6E8A-4147-A177-3AD203B41FA5}">
+                      <a16:colId xmlns:a16="http://schemas.microsoft.com/office/drawing/2014/main" val="20000"/>
+                    </a:ext>
+                  </a:extLst>
+                </a:gridCol>
               </a:tblGrid>
               <a:tr h="370840">
                 <a:tc>
@@ -6628,37 +6728,42 @@
                         <a:defRPr/>
                       </a:pPr>
                       <a:r>
-                        <a:rPr lang="pt-BR" dirty="0" smtClean="0"/>
+                        <a:rPr lang="pt-BR" dirty="0"/>
                         <a:t>Soluções Encontradas para 20 caracteres da Palavra-Alvo (</a:t>
                       </a:r>
                       <a:r>
-                        <a:rPr lang="pt-BR" dirty="0" err="1" smtClean="0"/>
+                        <a:rPr lang="pt-BR" dirty="0" err="1"/>
                         <a:t>Random</a:t>
                       </a:r>
                       <a:r>
-                        <a:rPr lang="pt-BR" dirty="0" smtClean="0"/>
+                        <a:rPr lang="pt-BR" dirty="0"/>
                         <a:t> </a:t>
                       </a:r>
                       <a:r>
-                        <a:rPr lang="pt-BR" dirty="0" err="1" smtClean="0"/>
+                        <a:rPr lang="pt-BR" dirty="0" err="1"/>
                         <a:t>Walk</a:t>
                       </a:r>
                       <a:r>
-                        <a:rPr lang="pt-BR" dirty="0" smtClean="0"/>
+                        <a:rPr lang="pt-BR" dirty="0"/>
                         <a:t>,</a:t>
                       </a:r>
                       <a:r>
-                        <a:rPr lang="pt-BR" baseline="0" dirty="0" smtClean="0"/>
+                        <a:rPr lang="pt-BR" baseline="0" dirty="0"/>
                         <a:t> </a:t>
                       </a:r>
                       <a:r>
-                        <a:rPr lang="pt-BR" dirty="0" smtClean="0"/>
+                        <a:rPr lang="pt-BR" dirty="0"/>
                         <a:t>População 100)</a:t>
                       </a:r>
                     </a:p>
                   </a:txBody>
                   <a:tcPr/>
                 </a:tc>
+                <a:extLst>
+                  <a:ext uri="{0D108BD9-81ED-4DB2-BD59-A6C34878D82A}">
+                    <a16:rowId xmlns:a16="http://schemas.microsoft.com/office/drawing/2014/main" val="10000"/>
+                  </a:ext>
+                </a:extLst>
               </a:tr>
               <a:tr h="370840">
                 <a:tc>
@@ -6667,14 +6772,18 @@
                     <a:lstStyle/>
                     <a:p>
                       <a:r>
-                        <a:rPr lang="pt-BR" dirty="0" smtClean="0"/>
+                        <a:rPr lang="pt-BR" dirty="0"/>
                         <a:t>56.664, 54.189, 70.707, 58.27, 90.83, 127.394, 71.664, 129.095, 54.444, 75.413, 57.343, 93.348, 110.926, 93.261, 84.589, 96.684, 106.283, 115.165, 109.602, 71.671</a:t>
                       </a:r>
-                      <a:endParaRPr lang="pt-BR" dirty="0"/>
-                    </a:p>
-                  </a:txBody>
-                  <a:tcPr/>
-                </a:tc>
+                    </a:p>
+                  </a:txBody>
+                  <a:tcPr/>
+                </a:tc>
+                <a:extLst>
+                  <a:ext uri="{0D108BD9-81ED-4DB2-BD59-A6C34878D82A}">
+                    <a16:rowId xmlns:a16="http://schemas.microsoft.com/office/drawing/2014/main" val="10001"/>
+                  </a:ext>
+                </a:extLst>
               </a:tr>
               <a:tr h="370840">
                 <a:tc>
@@ -6683,14 +6792,18 @@
                     <a:lstStyle/>
                     <a:p>
                       <a:r>
-                        <a:rPr lang="pt-BR" dirty="0" smtClean="0"/>
+                        <a:rPr lang="pt-BR" dirty="0"/>
                         <a:t>53.099, 59.356, 52.593, 57.827, 120.474, 122.314, 72.607, 116.925, 52.785, 113.321, 95.323, 81.762, 113.23, 61.019, 94.27, 87.411, 120.362, 91.557, 105.126, 64.778</a:t>
                       </a:r>
-                      <a:endParaRPr lang="pt-BR" dirty="0"/>
-                    </a:p>
-                  </a:txBody>
-                  <a:tcPr/>
-                </a:tc>
+                    </a:p>
+                  </a:txBody>
+                  <a:tcPr/>
+                </a:tc>
+                <a:extLst>
+                  <a:ext uri="{0D108BD9-81ED-4DB2-BD59-A6C34878D82A}">
+                    <a16:rowId xmlns:a16="http://schemas.microsoft.com/office/drawing/2014/main" val="10002"/>
+                  </a:ext>
+                </a:extLst>
               </a:tr>
               <a:tr h="370840">
                 <a:tc>
@@ -6699,14 +6812,18 @@
                     <a:lstStyle/>
                     <a:p>
                       <a:r>
-                        <a:rPr lang="pt-BR" dirty="0" smtClean="0"/>
+                        <a:rPr lang="pt-BR" dirty="0"/>
                         <a:t>79.891, 66.929, 52.57, 52.851, 109.838, 53.282, 85.39, 107.613, 52.826, 97.639, 83.533, 111.13, 112.574, 52.967, 115.477, 87.951, 107.198, 120.938, 95.245, 76.705</a:t>
                       </a:r>
-                      <a:endParaRPr lang="pt-BR" dirty="0"/>
-                    </a:p>
-                  </a:txBody>
-                  <a:tcPr/>
-                </a:tc>
+                    </a:p>
+                  </a:txBody>
+                  <a:tcPr/>
+                </a:tc>
+                <a:extLst>
+                  <a:ext uri="{0D108BD9-81ED-4DB2-BD59-A6C34878D82A}">
+                    <a16:rowId xmlns:a16="http://schemas.microsoft.com/office/drawing/2014/main" val="10003"/>
+                  </a:ext>
+                </a:extLst>
               </a:tr>
               <a:tr h="370840">
                 <a:tc>
@@ -6715,14 +6832,18 @@
                     <a:lstStyle/>
                     <a:p>
                       <a:r>
-                        <a:rPr lang="pt-BR" dirty="0" smtClean="0"/>
+                        <a:rPr lang="pt-BR" dirty="0"/>
                         <a:t>51.445, 59.026, 71.682, 71.593, 115.848, 115.255, 77.071, 116.802, 88.448, 63.765, 95.597, 115.338, 111.858, 51.839,102.722, 51.455, 106.538, 106.798, 105.8, 66.738</a:t>
                       </a:r>
-                      <a:endParaRPr lang="pt-BR" dirty="0"/>
-                    </a:p>
-                  </a:txBody>
-                  <a:tcPr/>
-                </a:tc>
+                    </a:p>
+                  </a:txBody>
+                  <a:tcPr/>
+                </a:tc>
+                <a:extLst>
+                  <a:ext uri="{0D108BD9-81ED-4DB2-BD59-A6C34878D82A}">
+                    <a16:rowId xmlns:a16="http://schemas.microsoft.com/office/drawing/2014/main" val="10004"/>
+                  </a:ext>
+                </a:extLst>
               </a:tr>
               <a:tr h="370840">
                 <a:tc>
@@ -6731,13 +6852,18 @@
                     <a:lstStyle/>
                     <a:p>
                       <a:r>
-                        <a:rPr lang="pt-BR" dirty="0" smtClean="0"/>
+                        <a:rPr lang="pt-BR" dirty="0"/>
                         <a:t>75.948, 71.405, 93.179, 59.212, 123.194, 102.255, 54.772, 116.417, 73.303, 87.913, 78.677, 127.019, 104.19, 60.899, 115.84, 85.18, 97.546, 111.782, 98.002, 73.632</a:t>
                       </a:r>
                     </a:p>
                   </a:txBody>
                   <a:tcPr/>
                 </a:tc>
+                <a:extLst>
+                  <a:ext uri="{0D108BD9-81ED-4DB2-BD59-A6C34878D82A}">
+                    <a16:rowId xmlns:a16="http://schemas.microsoft.com/office/drawing/2014/main" val="10005"/>
+                  </a:ext>
+                </a:extLst>
               </a:tr>
             </a:tbl>
           </a:graphicData>
@@ -6748,13 +6874,6 @@
   <p:clrMapOvr>
     <a:masterClrMapping/>
   </p:clrMapOvr>
-  <p:timing>
-    <p:tnLst>
-      <p:par>
-        <p:cTn id="1" dur="indefinite" restart="never" nodeType="tmRoot"/>
-      </p:par>
-    </p:tnLst>
-  </p:timing>
 </p:sld>
 </file>
 
@@ -6853,13 +6972,6 @@
   <p:clrMapOvr>
     <a:masterClrMapping/>
   </p:clrMapOvr>
-  <p:timing>
-    <p:tnLst>
-      <p:par>
-        <p:cTn id="1" dur="indefinite" restart="never" nodeType="tmRoot"/>
-      </p:par>
-    </p:tnLst>
-  </p:timing>
 </p:sld>
 </file>
 
@@ -6917,7 +7029,7 @@
               <a:t> </a:t>
             </a:r>
             <a:r>
-              <a:rPr lang="pt-BR" dirty="0" err="1" smtClean="0"/>
+              <a:rPr lang="pt-BR" dirty="0" err="1"/>
               <a:t>Walk</a:t>
             </a:r>
             <a:endParaRPr lang="pt-BR" dirty="0"/>
@@ -6958,13 +7070,6 @@
   <p:clrMapOvr>
     <a:masterClrMapping/>
   </p:clrMapOvr>
-  <p:timing>
-    <p:tnLst>
-      <p:par>
-        <p:cTn id="1" dur="indefinite" restart="never" nodeType="tmRoot"/>
-      </p:par>
-    </p:tnLst>
-  </p:timing>
 </p:sld>
 </file>
 
@@ -7050,7 +7155,13 @@
                 <a:tableStyleId>{5C22544A-7EE6-4342-B048-85BDC9FD1C3A}</a:tableStyleId>
               </a:tblPr>
               <a:tblGrid>
-                <a:gridCol w="10515600"/>
+                <a:gridCol w="10515600">
+                  <a:extLst>
+                    <a:ext uri="{9D8B030D-6E8A-4147-A177-3AD203B41FA5}">
+                      <a16:colId xmlns:a16="http://schemas.microsoft.com/office/drawing/2014/main" val="20000"/>
+                    </a:ext>
+                  </a:extLst>
+                </a:gridCol>
               </a:tblGrid>
               <a:tr h="370840">
                 <a:tc>
@@ -7075,21 +7186,26 @@
                         <a:defRPr/>
                       </a:pPr>
                       <a:r>
-                        <a:rPr lang="pt-BR" dirty="0" smtClean="0"/>
+                        <a:rPr lang="pt-BR" dirty="0"/>
                         <a:t>Soluções Encontradas para 30 caracteres da Palavra-Alvo (AG,</a:t>
                       </a:r>
                       <a:r>
-                        <a:rPr lang="pt-BR" baseline="0" dirty="0" smtClean="0"/>
+                        <a:rPr lang="pt-BR" baseline="0" dirty="0"/>
                         <a:t> </a:t>
                       </a:r>
                       <a:r>
-                        <a:rPr lang="pt-BR" dirty="0" smtClean="0"/>
+                        <a:rPr lang="pt-BR" dirty="0"/>
                         <a:t>População 100)</a:t>
                       </a:r>
                     </a:p>
                   </a:txBody>
                   <a:tcPr/>
                 </a:tc>
+                <a:extLst>
+                  <a:ext uri="{0D108BD9-81ED-4DB2-BD59-A6C34878D82A}">
+                    <a16:rowId xmlns:a16="http://schemas.microsoft.com/office/drawing/2014/main" val="10000"/>
+                  </a:ext>
+                </a:extLst>
               </a:tr>
               <a:tr h="370840">
                 <a:tc>
@@ -7098,14 +7214,18 @@
                     <a:lstStyle/>
                     <a:p>
                       <a:r>
-                        <a:rPr lang="pt-BR" dirty="0" smtClean="0"/>
+                        <a:rPr lang="pt-BR" dirty="0"/>
                         <a:t>52.547, 72.15, 53.694, 57.771, 115.88, 105.59, 75.368, 126.02, 52.756, 85.1, 80.525, 111.24, 113.62, 64.95, 89.181, 85.647, 101.71, 106.75, 110.37, 72.082, 104.38, 102.41, 63.009, 59.52, 89.869, 126.78, 77.231, 96.821, 67.905, 110.1</a:t>
                       </a:r>
-                      <a:endParaRPr lang="pt-BR" dirty="0"/>
-                    </a:p>
-                  </a:txBody>
-                  <a:tcPr/>
-                </a:tc>
+                    </a:p>
+                  </a:txBody>
+                  <a:tcPr/>
+                </a:tc>
+                <a:extLst>
+                  <a:ext uri="{0D108BD9-81ED-4DB2-BD59-A6C34878D82A}">
+                    <a16:rowId xmlns:a16="http://schemas.microsoft.com/office/drawing/2014/main" val="10001"/>
+                  </a:ext>
+                </a:extLst>
               </a:tr>
               <a:tr h="370840">
                 <a:tc>
@@ -7114,14 +7234,18 @@
                     <a:lstStyle/>
                     <a:p>
                       <a:r>
-                        <a:rPr lang="pt-BR" dirty="0" smtClean="0"/>
+                        <a:rPr lang="pt-BR" dirty="0"/>
                         <a:t>52.547, 72.15, 53.694, 57.771, 115.88, 105.59, 75.368, 126.02, 52.756, 85.1, 80.525, 111.24, 113.62, 64.95, 89.181, 85.647, 101.71, 106.75, 110.37, 72.082, 104.38, 102.41, 63.009, 59.52, 89.869, 126.78, 77.231, 96.821, 67.905, 110.1</a:t>
                       </a:r>
-                      <a:endParaRPr lang="pt-BR" dirty="0"/>
-                    </a:p>
-                  </a:txBody>
-                  <a:tcPr/>
-                </a:tc>
+                    </a:p>
+                  </a:txBody>
+                  <a:tcPr/>
+                </a:tc>
+                <a:extLst>
+                  <a:ext uri="{0D108BD9-81ED-4DB2-BD59-A6C34878D82A}">
+                    <a16:rowId xmlns:a16="http://schemas.microsoft.com/office/drawing/2014/main" val="10002"/>
+                  </a:ext>
+                </a:extLst>
               </a:tr>
               <a:tr h="370840">
                 <a:tc>
@@ -7130,14 +7254,18 @@
                     <a:lstStyle/>
                     <a:p>
                       <a:r>
-                        <a:rPr lang="pt-BR" dirty="0" smtClean="0"/>
+                        <a:rPr lang="pt-BR" dirty="0"/>
                         <a:t>52.547, 72.15, 53.694, 57.771, 115.88, 105.59, 75.368, 126.02, 52.756, 85.1, 80.525, 111.24, 113.62, 64.95, 89.181, 85.647, 101.71, 106.75, 110.37, 72.082, 104.38, 102.41, 63.009, 59.52, 89.869, 126.78, 77.231, 96.821, 67.905, 110.1</a:t>
                       </a:r>
-                      <a:endParaRPr lang="pt-BR" dirty="0"/>
-                    </a:p>
-                  </a:txBody>
-                  <a:tcPr/>
-                </a:tc>
+                    </a:p>
+                  </a:txBody>
+                  <a:tcPr/>
+                </a:tc>
+                <a:extLst>
+                  <a:ext uri="{0D108BD9-81ED-4DB2-BD59-A6C34878D82A}">
+                    <a16:rowId xmlns:a16="http://schemas.microsoft.com/office/drawing/2014/main" val="10003"/>
+                  </a:ext>
+                </a:extLst>
               </a:tr>
               <a:tr h="370840">
                 <a:tc>
@@ -7146,14 +7274,18 @@
                     <a:lstStyle/>
                     <a:p>
                       <a:r>
-                        <a:rPr lang="pt-BR" dirty="0" smtClean="0"/>
+                        <a:rPr lang="pt-BR" dirty="0"/>
                         <a:t>52.547, 72.15, 53.694, 57.771, 115.88, 105.59, 75.368, 126.02, 52.756, 85.1, 80.525, 111.24, 113.62, 64.95, 89.181, 85.647, 101.71, 106.75, 110.37, 72.082, 104.38, 102.41, 63.009, 59.52, 89.869, 126.78, 77.231, 96.821, 67.905, 110.1</a:t>
                       </a:r>
-                      <a:endParaRPr lang="pt-BR" dirty="0"/>
-                    </a:p>
-                  </a:txBody>
-                  <a:tcPr/>
-                </a:tc>
+                    </a:p>
+                  </a:txBody>
+                  <a:tcPr/>
+                </a:tc>
+                <a:extLst>
+                  <a:ext uri="{0D108BD9-81ED-4DB2-BD59-A6C34878D82A}">
+                    <a16:rowId xmlns:a16="http://schemas.microsoft.com/office/drawing/2014/main" val="10004"/>
+                  </a:ext>
+                </a:extLst>
               </a:tr>
               <a:tr h="370840">
                 <a:tc>
@@ -7162,14 +7294,18 @@
                     <a:lstStyle/>
                     <a:p>
                       <a:r>
-                        <a:rPr lang="pt-BR" dirty="0" smtClean="0"/>
+                        <a:rPr lang="pt-BR" dirty="0"/>
                         <a:t>52.547, 72.15, 53.694, 57.771, 115.88, 105.59, 75.368, 126.02, 52.756, 85.1, 80.525, 111.24, 113.62, 64.95, 89.181, 85.647, 101.71, 106.75, 110.37, 72.082, 104.38, 102.41, 63.009, 59.52, 89.869, 126.78, 77.231, 96.821, 67.905, 110.1</a:t>
                       </a:r>
-                      <a:endParaRPr lang="pt-BR" dirty="0"/>
-                    </a:p>
-                  </a:txBody>
-                  <a:tcPr/>
-                </a:tc>
+                    </a:p>
+                  </a:txBody>
+                  <a:tcPr/>
+                </a:tc>
+                <a:extLst>
+                  <a:ext uri="{0D108BD9-81ED-4DB2-BD59-A6C34878D82A}">
+                    <a16:rowId xmlns:a16="http://schemas.microsoft.com/office/drawing/2014/main" val="10005"/>
+                  </a:ext>
+                </a:extLst>
               </a:tr>
             </a:tbl>
           </a:graphicData>
@@ -7180,13 +7316,6 @@
   <p:clrMapOvr>
     <a:masterClrMapping/>
   </p:clrMapOvr>
-  <p:timing>
-    <p:tnLst>
-      <p:par>
-        <p:cTn id="1" dur="indefinite" restart="never" nodeType="tmRoot"/>
-      </p:par>
-    </p:tnLst>
-  </p:timing>
 </p:sld>
 </file>
 
@@ -7277,7 +7406,13 @@
                 <a:tableStyleId>{5C22544A-7EE6-4342-B048-85BDC9FD1C3A}</a:tableStyleId>
               </a:tblPr>
               <a:tblGrid>
-                <a:gridCol w="10515600"/>
+                <a:gridCol w="10515600">
+                  <a:extLst>
+                    <a:ext uri="{9D8B030D-6E8A-4147-A177-3AD203B41FA5}">
+                      <a16:colId xmlns:a16="http://schemas.microsoft.com/office/drawing/2014/main" val="20000"/>
+                    </a:ext>
+                  </a:extLst>
+                </a:gridCol>
               </a:tblGrid>
               <a:tr h="370840">
                 <a:tc>
@@ -7302,37 +7437,42 @@
                         <a:defRPr/>
                       </a:pPr>
                       <a:r>
-                        <a:rPr lang="pt-BR" dirty="0" smtClean="0"/>
+                        <a:rPr lang="pt-BR" dirty="0"/>
                         <a:t>Soluções Encontradas para 30 caracteres da Palavra-Alvo (</a:t>
                       </a:r>
                       <a:r>
-                        <a:rPr lang="pt-BR" dirty="0" err="1" smtClean="0"/>
+                        <a:rPr lang="pt-BR" dirty="0" err="1"/>
                         <a:t>Random</a:t>
                       </a:r>
                       <a:r>
-                        <a:rPr lang="pt-BR" dirty="0" smtClean="0"/>
+                        <a:rPr lang="pt-BR" dirty="0"/>
                         <a:t> </a:t>
                       </a:r>
                       <a:r>
-                        <a:rPr lang="pt-BR" dirty="0" err="1" smtClean="0"/>
+                        <a:rPr lang="pt-BR" dirty="0" err="1"/>
                         <a:t>Walk</a:t>
                       </a:r>
                       <a:r>
-                        <a:rPr lang="pt-BR" dirty="0" smtClean="0"/>
+                        <a:rPr lang="pt-BR" dirty="0"/>
                         <a:t>,</a:t>
                       </a:r>
                       <a:r>
-                        <a:rPr lang="pt-BR" baseline="0" dirty="0" smtClean="0"/>
+                        <a:rPr lang="pt-BR" baseline="0" dirty="0"/>
                         <a:t> </a:t>
                       </a:r>
                       <a:r>
-                        <a:rPr lang="pt-BR" dirty="0" smtClean="0"/>
+                        <a:rPr lang="pt-BR" dirty="0"/>
                         <a:t>População 100)</a:t>
                       </a:r>
                     </a:p>
                   </a:txBody>
                   <a:tcPr/>
                 </a:tc>
+                <a:extLst>
+                  <a:ext uri="{0D108BD9-81ED-4DB2-BD59-A6C34878D82A}">
+                    <a16:rowId xmlns:a16="http://schemas.microsoft.com/office/drawing/2014/main" val="10000"/>
+                  </a:ext>
+                </a:extLst>
               </a:tr>
               <a:tr h="370840">
                 <a:tc>
@@ -7341,14 +7481,18 @@
                     <a:lstStyle/>
                     <a:p>
                       <a:r>
-                        <a:rPr lang="pt-BR" dirty="0" smtClean="0"/>
+                        <a:rPr lang="pt-BR" dirty="0"/>
                         <a:t>57.708, 90.096, 92.017, 62.804, 98.15, 118.046, 67.356, 120.123, 56.688, 50.959, 74.289, 103.658, 118.573, 66.177, 100.815, 50.996, 100.764, 107.374, 112.106, 56.781, 98.81, 97.378, 64.704, 52.844, 90.847, 85.176, 97.467, 60.939, 105.083, 103.555</a:t>
                       </a:r>
-                      <a:endParaRPr lang="pt-BR" dirty="0"/>
-                    </a:p>
-                  </a:txBody>
-                  <a:tcPr/>
-                </a:tc>
+                    </a:p>
+                  </a:txBody>
+                  <a:tcPr/>
+                </a:tc>
+                <a:extLst>
+                  <a:ext uri="{0D108BD9-81ED-4DB2-BD59-A6C34878D82A}">
+                    <a16:rowId xmlns:a16="http://schemas.microsoft.com/office/drawing/2014/main" val="10001"/>
+                  </a:ext>
+                </a:extLst>
               </a:tr>
               <a:tr h="370840">
                 <a:tc>
@@ -7357,14 +7501,18 @@
                     <a:lstStyle/>
                     <a:p>
                       <a:r>
-                        <a:rPr lang="pt-BR" dirty="0" smtClean="0"/>
+                        <a:rPr lang="pt-BR" dirty="0"/>
                         <a:t>68.126, 53.475, 56.305, 85.574, 126.972, 76.354, 81.894, 122.897, 51.566, 113.227, 101.274, 95.812, 121.234, 79.294, 71.18, 82.855, 72.378, 99.857, 115.566, 70.216, 107.354, 110.774, 79.127, 55.093, 82.633, 127.874, 69.638, 121.618, 61.298, 91.459</a:t>
                       </a:r>
-                      <a:endParaRPr lang="pt-BR" dirty="0"/>
-                    </a:p>
-                  </a:txBody>
-                  <a:tcPr/>
-                </a:tc>
+                    </a:p>
+                  </a:txBody>
+                  <a:tcPr/>
+                </a:tc>
+                <a:extLst>
+                  <a:ext uri="{0D108BD9-81ED-4DB2-BD59-A6C34878D82A}">
+                    <a16:rowId xmlns:a16="http://schemas.microsoft.com/office/drawing/2014/main" val="10002"/>
+                  </a:ext>
+                </a:extLst>
               </a:tr>
               <a:tr h="370840">
                 <a:tc>
@@ -7373,14 +7521,18 @@
                     <a:lstStyle/>
                     <a:p>
                       <a:r>
-                        <a:rPr lang="pt-BR" dirty="0" smtClean="0"/>
+                        <a:rPr lang="pt-BR" dirty="0"/>
                         <a:t>52.027, 82.047, 86.514, 77.587, 102.549, 103.601, 97.273, 114.595, 52.115, 98.382, 51.945, 119.609, 92.19, 87.627, 101.094, 96.007, 99.361, 99.25, 109.594, 63.366, 82.184, 112.283, 95.038, 61.15, 93.198, 102.774, 74.739, 97.478, 101.354, 106.802</a:t>
                       </a:r>
-                      <a:endParaRPr lang="pt-BR" dirty="0"/>
-                    </a:p>
-                  </a:txBody>
-                  <a:tcPr/>
-                </a:tc>
+                    </a:p>
+                  </a:txBody>
+                  <a:tcPr/>
+                </a:tc>
+                <a:extLst>
+                  <a:ext uri="{0D108BD9-81ED-4DB2-BD59-A6C34878D82A}">
+                    <a16:rowId xmlns:a16="http://schemas.microsoft.com/office/drawing/2014/main" val="10003"/>
+                  </a:ext>
+                </a:extLst>
               </a:tr>
               <a:tr h="370840">
                 <a:tc>
@@ -7389,14 +7541,18 @@
                     <a:lstStyle/>
                     <a:p>
                       <a:r>
-                        <a:rPr lang="pt-BR" dirty="0" smtClean="0"/>
+                        <a:rPr lang="pt-BR" dirty="0"/>
                         <a:t>52.546, 98.211, 56.79, 61.515, 98.929, 75.237, 71.986, 115.706, 74.742, 72.595, 82.832, 102.122, 121.055, 79.201, 94.854, 101.708, 114.058, 100.572, 100.377, 69.339, 86.026, 103.852, 53.237, 87.472, 79.81, 102.342, 111.826, 108.73, 67.913, 96.45</a:t>
                       </a:r>
-                      <a:endParaRPr lang="pt-BR" dirty="0"/>
-                    </a:p>
-                  </a:txBody>
-                  <a:tcPr/>
-                </a:tc>
+                    </a:p>
+                  </a:txBody>
+                  <a:tcPr/>
+                </a:tc>
+                <a:extLst>
+                  <a:ext uri="{0D108BD9-81ED-4DB2-BD59-A6C34878D82A}">
+                    <a16:rowId xmlns:a16="http://schemas.microsoft.com/office/drawing/2014/main" val="10004"/>
+                  </a:ext>
+                </a:extLst>
               </a:tr>
               <a:tr h="370840">
                 <a:tc>
@@ -7405,13 +7561,18 @@
                     <a:lstStyle/>
                     <a:p>
                       <a:r>
-                        <a:rPr lang="pt-BR" dirty="0" smtClean="0"/>
+                        <a:rPr lang="pt-BR" dirty="0"/>
                         <a:t>82.906, 97.782, 62.562, 66.871, 72.059, 99.862, 58.822, 126.546, 51.641, 113.533, 75.261, 122.574, 119.234, 63.264, 71.06, 77.862, 100.122, 99.486, 61.417, 72.231, 106.935, 95.552, 54.209, 105.529, 103.79, 97.378, 86.426, 92.39, 74.36, 119.682</a:t>
                       </a:r>
                     </a:p>
                   </a:txBody>
                   <a:tcPr/>
                 </a:tc>
+                <a:extLst>
+                  <a:ext uri="{0D108BD9-81ED-4DB2-BD59-A6C34878D82A}">
+                    <a16:rowId xmlns:a16="http://schemas.microsoft.com/office/drawing/2014/main" val="10005"/>
+                  </a:ext>
+                </a:extLst>
               </a:tr>
             </a:tbl>
           </a:graphicData>
@@ -7422,13 +7583,6 @@
   <p:clrMapOvr>
     <a:masterClrMapping/>
   </p:clrMapOvr>
-  <p:timing>
-    <p:tnLst>
-      <p:par>
-        <p:cTn id="1" dur="indefinite" restart="never" nodeType="tmRoot"/>
-      </p:par>
-    </p:tnLst>
-  </p:timing>
 </p:sld>
 </file>
 
@@ -7527,13 +7681,6 @@
   <p:clrMapOvr>
     <a:masterClrMapping/>
   </p:clrMapOvr>
-  <p:timing>
-    <p:tnLst>
-      <p:par>
-        <p:cTn id="1" dur="indefinite" restart="never" nodeType="tmRoot"/>
-      </p:par>
-    </p:tnLst>
-  </p:timing>
 </p:sld>
 </file>
 
@@ -7632,13 +7779,6 @@
   <p:clrMapOvr>
     <a:masterClrMapping/>
   </p:clrMapOvr>
-  <p:timing>
-    <p:tnLst>
-      <p:par>
-        <p:cTn id="1" dur="indefinite" restart="never" nodeType="tmRoot"/>
-      </p:par>
-    </p:tnLst>
-  </p:timing>
 </p:sld>
 </file>
 
@@ -7737,13 +7877,6 @@
   <p:clrMapOvr>
     <a:masterClrMapping/>
   </p:clrMapOvr>
-  <p:timing>
-    <p:tnLst>
-      <p:par>
-        <p:cTn id="1" dur="indefinite" restart="never" nodeType="tmRoot"/>
-      </p:par>
-    </p:tnLst>
-  </p:timing>
 </p:sld>
 </file>
 
@@ -7842,13 +7975,6 @@
   <p:clrMapOvr>
     <a:masterClrMapping/>
   </p:clrMapOvr>
-  <p:timing>
-    <p:tnLst>
-      <p:par>
-        <p:cTn id="1" dur="indefinite" restart="never" nodeType="tmRoot"/>
-      </p:par>
-    </p:tnLst>
-  </p:timing>
 </p:sld>
 </file>
 
@@ -7947,13 +8073,6 @@
   <p:clrMapOvr>
     <a:masterClrMapping/>
   </p:clrMapOvr>
-  <p:timing>
-    <p:tnLst>
-      <p:par>
-        <p:cTn id="1" dur="indefinite" restart="never" nodeType="tmRoot"/>
-      </p:par>
-    </p:tnLst>
-  </p:timing>
 </p:sld>
 </file>
 
@@ -7991,10 +8110,9 @@
           <a:p>
             <a:pPr algn="ctr"/>
             <a:r>
-              <a:rPr lang="pt-BR" dirty="0" smtClean="0"/>
+              <a:rPr lang="pt-BR" dirty="0"/>
               <a:t>Objetivo</a:t>
             </a:r>
-            <a:endParaRPr lang="pt-BR" dirty="0"/>
           </a:p>
         </p:txBody>
       </p:sp>
@@ -8020,46 +8138,46 @@
           <a:p>
             <a:pPr algn="just"/>
             <a:r>
-              <a:rPr lang="pt-BR" dirty="0" smtClean="0"/>
+              <a:rPr lang="pt-BR" dirty="0"/>
               <a:t>A implementação tem como objetivo fazer com que tanto o AG como o </a:t>
             </a:r>
             <a:r>
-              <a:rPr lang="pt-BR" dirty="0" err="1" smtClean="0"/>
+              <a:rPr lang="pt-BR" dirty="0" err="1"/>
               <a:t>Random</a:t>
             </a:r>
             <a:r>
-              <a:rPr lang="pt-BR" dirty="0" smtClean="0"/>
+              <a:rPr lang="pt-BR" dirty="0"/>
               <a:t> </a:t>
             </a:r>
             <a:r>
-              <a:rPr lang="pt-BR" dirty="0" err="1" smtClean="0"/>
+              <a:rPr lang="pt-BR" dirty="0" err="1"/>
               <a:t>Walk</a:t>
             </a:r>
             <a:r>
-              <a:rPr lang="pt-BR" dirty="0" smtClean="0"/>
+              <a:rPr lang="pt-BR" dirty="0"/>
               <a:t> sejam capazes de acertar uma palavra-alvo de acordo seus </a:t>
             </a:r>
             <a:r>
-              <a:rPr lang="pt-BR" i="1" dirty="0" smtClean="0"/>
+              <a:rPr lang="pt-BR" i="1" dirty="0"/>
               <a:t>n </a:t>
             </a:r>
             <a:r>
-              <a:rPr lang="pt-BR" dirty="0" smtClean="0"/>
+              <a:rPr lang="pt-BR" dirty="0"/>
               <a:t>primeiros caracteres (10, 20 e 30), para populações de 50 a 100 cromossomos, ao longo de 5 execuções.</a:t>
             </a:r>
             <a:endParaRPr lang="pt-BR" i="1" dirty="0"/>
           </a:p>
           <a:p>
             <a:r>
-              <a:rPr lang="pt-BR" dirty="0" smtClean="0"/>
+              <a:rPr lang="pt-BR" dirty="0"/>
               <a:t>Gráficos e tabelas são utilizados para a ilustrar os resultados obtidos.</a:t>
             </a:r>
           </a:p>
           <a:p>
-            <a:endParaRPr lang="pt-BR" dirty="0" smtClean="0"/>
-          </a:p>
-          <a:p>
-            <a:endParaRPr lang="pt-BR" dirty="0" smtClean="0"/>
+            <a:endParaRPr lang="pt-BR" dirty="0"/>
+          </a:p>
+          <a:p>
+            <a:endParaRPr lang="pt-BR" dirty="0"/>
           </a:p>
         </p:txBody>
       </p:sp>
@@ -8092,13 +8210,6 @@
   <p:clrMapOvr>
     <a:masterClrMapping/>
   </p:clrMapOvr>
-  <p:timing>
-    <p:tnLst>
-      <p:par>
-        <p:cTn id="1" dur="indefinite" restart="never" nodeType="tmRoot"/>
-      </p:par>
-    </p:tnLst>
-  </p:timing>
 </p:sld>
 </file>
 
@@ -8136,10 +8247,9 @@
           <a:p>
             <a:pPr algn="ctr"/>
             <a:r>
-              <a:rPr lang="pt-BR" dirty="0" smtClean="0"/>
+              <a:rPr lang="pt-BR" dirty="0"/>
               <a:t>Conclusão</a:t>
             </a:r>
-            <a:endParaRPr lang="pt-BR" dirty="0"/>
           </a:p>
         </p:txBody>
       </p:sp>
@@ -8165,23 +8275,23 @@
           <a:p>
             <a:pPr algn="just"/>
             <a:r>
-              <a:rPr lang="pt-BR" dirty="0" smtClean="0"/>
+              <a:rPr lang="pt-BR" dirty="0"/>
               <a:t>O AG mostrou-se eficiente para encontrar a palavra-alvo, acertando por completo em todos os testes, neste quesito o </a:t>
             </a:r>
             <a:r>
-              <a:rPr lang="pt-BR" dirty="0" err="1" smtClean="0"/>
+              <a:rPr lang="pt-BR" dirty="0" err="1"/>
               <a:t>Random</a:t>
             </a:r>
             <a:r>
-              <a:rPr lang="pt-BR" dirty="0" smtClean="0"/>
+              <a:rPr lang="pt-BR" dirty="0"/>
               <a:t> </a:t>
             </a:r>
             <a:r>
-              <a:rPr lang="pt-BR" dirty="0" err="1" smtClean="0"/>
+              <a:rPr lang="pt-BR" dirty="0" err="1"/>
               <a:t>Walk</a:t>
             </a:r>
             <a:r>
-              <a:rPr lang="pt-BR" dirty="0" smtClean="0"/>
+              <a:rPr lang="pt-BR" dirty="0"/>
               <a:t> falhou em todos.</a:t>
             </a:r>
           </a:p>
@@ -8192,12 +8302,12 @@
           <a:p>
             <a:pPr algn="just"/>
             <a:r>
-              <a:rPr lang="pt-BR" dirty="0" smtClean="0"/>
+              <a:rPr lang="pt-BR" dirty="0"/>
               <a:t>Neste trabalho, o AG estava inicialmente com um alto desvio-padrão a cada geração, dificultando sua compreensão. O problema foi resolvido reduzindo a taxa de mutação e desvio-padrão.</a:t>
             </a:r>
           </a:p>
           <a:p>
-            <a:endParaRPr lang="pt-BR" dirty="0" smtClean="0"/>
+            <a:endParaRPr lang="pt-BR" dirty="0"/>
           </a:p>
           <a:p>
             <a:pPr algn="just"/>
@@ -8210,13 +8320,6 @@
   <p:clrMapOvr>
     <a:masterClrMapping/>
   </p:clrMapOvr>
-  <p:timing>
-    <p:tnLst>
-      <p:par>
-        <p:cTn id="1" dur="indefinite" restart="never" nodeType="tmRoot"/>
-      </p:par>
-    </p:tnLst>
-  </p:timing>
 </p:sld>
 </file>
 
@@ -8254,10 +8357,9 @@
           <a:p>
             <a:pPr algn="ctr"/>
             <a:r>
-              <a:rPr lang="pt-BR" dirty="0" smtClean="0"/>
+              <a:rPr lang="pt-BR" dirty="0"/>
               <a:t>Agradecimento</a:t>
             </a:r>
-            <a:endParaRPr lang="pt-BR" dirty="0"/>
           </a:p>
         </p:txBody>
       </p:sp>
@@ -8277,10 +8379,9 @@
           <a:lstStyle/>
           <a:p>
             <a:r>
-              <a:rPr lang="pt-BR" sz="5400" dirty="0" smtClean="0"/>
+              <a:rPr lang="pt-BR" sz="5400" dirty="0"/>
               <a:t>Obrigado pela atenção!</a:t>
             </a:r>
-            <a:endParaRPr lang="pt-BR" sz="5400" dirty="0"/>
           </a:p>
         </p:txBody>
       </p:sp>
@@ -8289,13 +8390,6 @@
   <p:clrMapOvr>
     <a:masterClrMapping/>
   </p:clrMapOvr>
-  <p:timing>
-    <p:tnLst>
-      <p:par>
-        <p:cTn id="1" dur="indefinite" restart="never" nodeType="tmRoot"/>
-      </p:par>
-    </p:tnLst>
-  </p:timing>
 </p:sld>
 </file>
 
@@ -8338,10 +8432,9 @@
           <a:p>
             <a:pPr algn="ctr"/>
             <a:r>
-              <a:rPr lang="pt-BR" dirty="0" smtClean="0"/>
+              <a:rPr lang="pt-BR" dirty="0"/>
               <a:t>Diagrama UML - AG</a:t>
             </a:r>
-            <a:endParaRPr lang="pt-BR" dirty="0"/>
           </a:p>
         </p:txBody>
       </p:sp>
@@ -8376,13 +8469,6 @@
   <p:clrMapOvr>
     <a:masterClrMapping/>
   </p:clrMapOvr>
-  <p:timing>
-    <p:tnLst>
-      <p:par>
-        <p:cTn id="1" dur="indefinite" restart="never" nodeType="tmRoot"/>
-      </p:par>
-    </p:tnLst>
-  </p:timing>
 </p:sld>
 </file>
 
@@ -8420,19 +8506,19 @@
           <a:p>
             <a:pPr algn="ctr"/>
             <a:r>
-              <a:rPr lang="pt-BR" dirty="0" smtClean="0"/>
+              <a:rPr lang="pt-BR" dirty="0"/>
               <a:t>Diagrama UML – </a:t>
             </a:r>
             <a:r>
-              <a:rPr lang="pt-BR" dirty="0" err="1" smtClean="0"/>
+              <a:rPr lang="pt-BR" dirty="0" err="1"/>
               <a:t>Random</a:t>
             </a:r>
             <a:r>
-              <a:rPr lang="pt-BR" dirty="0" smtClean="0"/>
+              <a:rPr lang="pt-BR" dirty="0"/>
               <a:t> </a:t>
             </a:r>
             <a:r>
-              <a:rPr lang="pt-BR" dirty="0" err="1" smtClean="0"/>
+              <a:rPr lang="pt-BR" dirty="0" err="1"/>
               <a:t>Walk</a:t>
             </a:r>
             <a:endParaRPr lang="pt-BR" dirty="0"/>
@@ -8470,13 +8556,6 @@
   <p:clrMapOvr>
     <a:masterClrMapping/>
   </p:clrMapOvr>
-  <p:timing>
-    <p:tnLst>
-      <p:par>
-        <p:cTn id="1" dur="indefinite" restart="never" nodeType="tmRoot"/>
-      </p:par>
-    </p:tnLst>
-  </p:timing>
 </p:sld>
 </file>
 
@@ -8564,35 +8643,18 @@
           <a:lstStyle/>
           <a:p>
             <a:r>
-              <a:rPr lang="pt-BR" altLang="en-US" dirty="0" smtClean="0"/>
+              <a:rPr lang="pt-BR" altLang="en-US" dirty="0"/>
               <a:t>Quanto a demonstração dos resultados em gráficos:</a:t>
             </a:r>
           </a:p>
           <a:p>
-            <a:endParaRPr lang="pt-BR" altLang="en-US" dirty="0" smtClean="0"/>
-          </a:p>
-          <a:p>
-            <a:r>
-              <a:rPr lang="pt-BR" altLang="en-US" dirty="0" smtClean="0"/>
-              <a:t>Colocar </a:t>
-            </a:r>
+            <a:endParaRPr lang="pt-BR" altLang="en-US" dirty="0"/>
+          </a:p>
+          <a:p>
             <a:r>
               <a:rPr lang="pt-BR" altLang="en-US" dirty="0"/>
-              <a:t>no mesmo gráfico a evolução do RW e AG </a:t>
-            </a:r>
-            <a:r>
-              <a:rPr lang="pt-BR" altLang="en-US" dirty="0" smtClean="0"/>
-              <a:t>(Calcular </a:t>
-            </a:r>
-            <a:r>
-              <a:rPr lang="pt-BR" altLang="en-US" dirty="0"/>
-              <a:t>a média e o desvio padrão por geração das R execuções do fitness do melhor </a:t>
-            </a:r>
-            <a:r>
-              <a:rPr lang="pt-BR" altLang="en-US" dirty="0" smtClean="0"/>
-              <a:t>indivíduo)</a:t>
-            </a:r>
-            <a:endParaRPr lang="pt-BR" altLang="en-US" dirty="0"/>
+              <a:t>Colocar no mesmo gráfico a evolução do RW e AG (Calcular a média e o desvio padrão por geração das R execuções do fitness do melhor indivíduo)</a:t>
+            </a:r>
           </a:p>
           <a:p>
             <a:r>
@@ -8712,13 +8774,55 @@
                 <a:tableStyleId>{5C22544A-7EE6-4342-B048-85BDC9FD1C3A}</a:tableStyleId>
               </a:tblPr>
               <a:tblGrid>
-                <a:gridCol w="1650380"/>
-                <a:gridCol w="1650380"/>
-                <a:gridCol w="1650380"/>
-                <a:gridCol w="1650380"/>
-                <a:gridCol w="1650380"/>
-                <a:gridCol w="1650380"/>
-                <a:gridCol w="1685981"/>
+                <a:gridCol w="1650380">
+                  <a:extLst>
+                    <a:ext uri="{9D8B030D-6E8A-4147-A177-3AD203B41FA5}">
+                      <a16:colId xmlns:a16="http://schemas.microsoft.com/office/drawing/2014/main" val="20000"/>
+                    </a:ext>
+                  </a:extLst>
+                </a:gridCol>
+                <a:gridCol w="1650380">
+                  <a:extLst>
+                    <a:ext uri="{9D8B030D-6E8A-4147-A177-3AD203B41FA5}">
+                      <a16:colId xmlns:a16="http://schemas.microsoft.com/office/drawing/2014/main" val="20001"/>
+                    </a:ext>
+                  </a:extLst>
+                </a:gridCol>
+                <a:gridCol w="1650380">
+                  <a:extLst>
+                    <a:ext uri="{9D8B030D-6E8A-4147-A177-3AD203B41FA5}">
+                      <a16:colId xmlns:a16="http://schemas.microsoft.com/office/drawing/2014/main" val="20002"/>
+                    </a:ext>
+                  </a:extLst>
+                </a:gridCol>
+                <a:gridCol w="1650380">
+                  <a:extLst>
+                    <a:ext uri="{9D8B030D-6E8A-4147-A177-3AD203B41FA5}">
+                      <a16:colId xmlns:a16="http://schemas.microsoft.com/office/drawing/2014/main" val="20003"/>
+                    </a:ext>
+                  </a:extLst>
+                </a:gridCol>
+                <a:gridCol w="1650380">
+                  <a:extLst>
+                    <a:ext uri="{9D8B030D-6E8A-4147-A177-3AD203B41FA5}">
+                      <a16:colId xmlns:a16="http://schemas.microsoft.com/office/drawing/2014/main" val="20004"/>
+                    </a:ext>
+                  </a:extLst>
+                </a:gridCol>
+                <a:gridCol w="1650380">
+                  <a:extLst>
+                    <a:ext uri="{9D8B030D-6E8A-4147-A177-3AD203B41FA5}">
+                      <a16:colId xmlns:a16="http://schemas.microsoft.com/office/drawing/2014/main" val="20005"/>
+                    </a:ext>
+                  </a:extLst>
+                </a:gridCol>
+                <a:gridCol w="1685981">
+                  <a:extLst>
+                    <a:ext uri="{9D8B030D-6E8A-4147-A177-3AD203B41FA5}">
+                      <a16:colId xmlns:a16="http://schemas.microsoft.com/office/drawing/2014/main" val="20006"/>
+                    </a:ext>
+                  </a:extLst>
+                </a:gridCol>
               </a:tblGrid>
               <a:tr h="370840">
                 <a:tc>
@@ -8728,10 +8832,9 @@
                     <a:p>
                       <a:pPr algn="ctr"/>
                       <a:r>
-                        <a:rPr lang="pt-BR" dirty="0" smtClean="0"/>
+                        <a:rPr lang="pt-BR" dirty="0"/>
                         <a:t>Parâmetro</a:t>
                       </a:r>
-                      <a:endParaRPr lang="pt-BR" dirty="0"/>
                     </a:p>
                   </a:txBody>
                   <a:tcPr/>
@@ -8743,10 +8846,9 @@
                     <a:p>
                       <a:pPr algn="ctr"/>
                       <a:r>
-                        <a:rPr lang="pt-BR" dirty="0" smtClean="0"/>
+                        <a:rPr lang="pt-BR" dirty="0"/>
                         <a:t>10/50</a:t>
                       </a:r>
-                      <a:endParaRPr lang="pt-BR" dirty="0"/>
                     </a:p>
                   </a:txBody>
                   <a:tcPr/>
@@ -8758,10 +8860,9 @@
                     <a:p>
                       <a:pPr algn="ctr"/>
                       <a:r>
-                        <a:rPr lang="pt-BR" dirty="0" smtClean="0"/>
+                        <a:rPr lang="pt-BR" dirty="0"/>
                         <a:t>20/50</a:t>
                       </a:r>
-                      <a:endParaRPr lang="pt-BR" dirty="0"/>
                     </a:p>
                   </a:txBody>
                   <a:tcPr/>
@@ -8773,10 +8874,9 @@
                     <a:p>
                       <a:pPr algn="ctr"/>
                       <a:r>
-                        <a:rPr lang="pt-BR" dirty="0" smtClean="0"/>
+                        <a:rPr lang="pt-BR" dirty="0"/>
                         <a:t>30/50</a:t>
                       </a:r>
-                      <a:endParaRPr lang="pt-BR" dirty="0"/>
                     </a:p>
                   </a:txBody>
                   <a:tcPr/>
@@ -8788,10 +8888,9 @@
                     <a:p>
                       <a:pPr algn="ctr"/>
                       <a:r>
-                        <a:rPr lang="pt-BR" dirty="0" smtClean="0"/>
+                        <a:rPr lang="pt-BR" dirty="0"/>
                         <a:t>10/100</a:t>
                       </a:r>
-                      <a:endParaRPr lang="pt-BR" dirty="0"/>
                     </a:p>
                   </a:txBody>
                   <a:tcPr/>
@@ -8803,10 +8902,9 @@
                     <a:p>
                       <a:pPr algn="ctr"/>
                       <a:r>
-                        <a:rPr lang="pt-BR" dirty="0" smtClean="0"/>
+                        <a:rPr lang="pt-BR" dirty="0"/>
                         <a:t>20/100</a:t>
                       </a:r>
-                      <a:endParaRPr lang="pt-BR" dirty="0"/>
                     </a:p>
                   </a:txBody>
                   <a:tcPr/>
@@ -8818,14 +8916,18 @@
                     <a:p>
                       <a:pPr algn="ctr"/>
                       <a:r>
-                        <a:rPr lang="pt-BR" dirty="0" smtClean="0"/>
+                        <a:rPr lang="pt-BR" dirty="0"/>
                         <a:t>30/100</a:t>
                       </a:r>
-                      <a:endParaRPr lang="pt-BR" dirty="0"/>
-                    </a:p>
-                  </a:txBody>
-                  <a:tcPr/>
-                </a:tc>
+                    </a:p>
+                  </a:txBody>
+                  <a:tcPr/>
+                </a:tc>
+                <a:extLst>
+                  <a:ext uri="{0D108BD9-81ED-4DB2-BD59-A6C34878D82A}">
+                    <a16:rowId xmlns:a16="http://schemas.microsoft.com/office/drawing/2014/main" val="10000"/>
+                  </a:ext>
+                </a:extLst>
               </a:tr>
               <a:tr h="370840">
                 <a:tc>
@@ -8835,11 +8937,11 @@
                     <a:p>
                       <a:pPr algn="ctr"/>
                       <a:r>
-                        <a:rPr lang="pt-BR" dirty="0" smtClean="0"/>
+                        <a:rPr lang="pt-BR" dirty="0"/>
                         <a:t>Tamanho do </a:t>
                       </a:r>
                       <a:r>
-                        <a:rPr lang="pt-BR" dirty="0" err="1" smtClean="0"/>
+                        <a:rPr lang="pt-BR" dirty="0" err="1"/>
                         <a:t>Ring</a:t>
                       </a:r>
                       <a:endParaRPr lang="pt-BR" dirty="0"/>
@@ -8854,10 +8956,9 @@
                     <a:p>
                       <a:pPr algn="ctr"/>
                       <a:r>
-                        <a:rPr lang="pt-BR" dirty="0" smtClean="0"/>
+                        <a:rPr lang="pt-BR" dirty="0"/>
                         <a:t>5</a:t>
                       </a:r>
-                      <a:endParaRPr lang="pt-BR" dirty="0"/>
                     </a:p>
                   </a:txBody>
                   <a:tcPr/>
@@ -8869,10 +8970,9 @@
                     <a:p>
                       <a:pPr algn="ctr"/>
                       <a:r>
-                        <a:rPr lang="pt-BR" dirty="0" smtClean="0"/>
+                        <a:rPr lang="pt-BR" dirty="0"/>
                         <a:t>5</a:t>
                       </a:r>
-                      <a:endParaRPr lang="pt-BR" dirty="0"/>
                     </a:p>
                   </a:txBody>
                   <a:tcPr/>
@@ -8884,10 +8984,9 @@
                     <a:p>
                       <a:pPr algn="ctr"/>
                       <a:r>
-                        <a:rPr lang="pt-BR" dirty="0" smtClean="0"/>
+                        <a:rPr lang="pt-BR" dirty="0"/>
                         <a:t>5</a:t>
                       </a:r>
-                      <a:endParaRPr lang="pt-BR" dirty="0"/>
                     </a:p>
                   </a:txBody>
                   <a:tcPr/>
@@ -8899,10 +8998,9 @@
                     <a:p>
                       <a:pPr algn="ctr"/>
                       <a:r>
-                        <a:rPr lang="pt-BR" dirty="0" smtClean="0"/>
+                        <a:rPr lang="pt-BR" dirty="0"/>
                         <a:t>5</a:t>
                       </a:r>
-                      <a:endParaRPr lang="pt-BR" dirty="0"/>
                     </a:p>
                   </a:txBody>
                   <a:tcPr/>
@@ -8914,10 +9012,9 @@
                     <a:p>
                       <a:pPr algn="ctr"/>
                       <a:r>
-                        <a:rPr lang="pt-BR" dirty="0" smtClean="0"/>
+                        <a:rPr lang="pt-BR" dirty="0"/>
                         <a:t>5</a:t>
                       </a:r>
-                      <a:endParaRPr lang="pt-BR" dirty="0"/>
                     </a:p>
                   </a:txBody>
                   <a:tcPr/>
@@ -8929,14 +9026,18 @@
                     <a:p>
                       <a:pPr algn="ctr"/>
                       <a:r>
-                        <a:rPr lang="pt-BR" dirty="0" smtClean="0"/>
+                        <a:rPr lang="pt-BR" dirty="0"/>
                         <a:t>5</a:t>
                       </a:r>
-                      <a:endParaRPr lang="pt-BR" dirty="0"/>
-                    </a:p>
-                  </a:txBody>
-                  <a:tcPr/>
-                </a:tc>
+                    </a:p>
+                  </a:txBody>
+                  <a:tcPr/>
+                </a:tc>
+                <a:extLst>
+                  <a:ext uri="{0D108BD9-81ED-4DB2-BD59-A6C34878D82A}">
+                    <a16:rowId xmlns:a16="http://schemas.microsoft.com/office/drawing/2014/main" val="10001"/>
+                  </a:ext>
+                </a:extLst>
               </a:tr>
               <a:tr h="370840">
                 <a:tc>
@@ -8946,18 +9047,17 @@
                     <a:p>
                       <a:pPr algn="ctr"/>
                       <a:r>
-                        <a:rPr lang="pt-BR" dirty="0" smtClean="0"/>
+                        <a:rPr lang="pt-BR" dirty="0"/>
                         <a:t>Probabilidade</a:t>
                       </a:r>
                       <a:r>
-                        <a:rPr lang="pt-BR" baseline="0" dirty="0" smtClean="0"/>
+                        <a:rPr lang="pt-BR" baseline="0" dirty="0"/>
                         <a:t> de </a:t>
                       </a:r>
                       <a:r>
-                        <a:rPr lang="pt-BR" dirty="0" smtClean="0"/>
+                        <a:rPr lang="pt-BR" dirty="0"/>
                         <a:t>Cruzamento</a:t>
                       </a:r>
-                      <a:endParaRPr lang="pt-BR" dirty="0"/>
                     </a:p>
                   </a:txBody>
                   <a:tcPr/>
@@ -8969,10 +9069,9 @@
                     <a:p>
                       <a:pPr algn="ctr"/>
                       <a:r>
-                        <a:rPr lang="pt-BR" dirty="0" smtClean="0"/>
+                        <a:rPr lang="pt-BR" dirty="0"/>
                         <a:t>0.7</a:t>
                       </a:r>
-                      <a:endParaRPr lang="pt-BR" dirty="0"/>
                     </a:p>
                   </a:txBody>
                   <a:tcPr/>
@@ -8984,10 +9083,9 @@
                     <a:p>
                       <a:pPr algn="ctr"/>
                       <a:r>
-                        <a:rPr lang="pt-BR" dirty="0" smtClean="0"/>
+                        <a:rPr lang="pt-BR" dirty="0"/>
                         <a:t>0.7</a:t>
                       </a:r>
-                      <a:endParaRPr lang="pt-BR" dirty="0"/>
                     </a:p>
                   </a:txBody>
                   <a:tcPr/>
@@ -8999,10 +9097,9 @@
                     <a:p>
                       <a:pPr algn="ctr"/>
                       <a:r>
-                        <a:rPr lang="pt-BR" dirty="0" smtClean="0"/>
+                        <a:rPr lang="pt-BR" dirty="0"/>
                         <a:t>0.7</a:t>
                       </a:r>
-                      <a:endParaRPr lang="pt-BR" dirty="0"/>
                     </a:p>
                   </a:txBody>
                   <a:tcPr/>
@@ -9014,10 +9111,9 @@
                     <a:p>
                       <a:pPr algn="ctr"/>
                       <a:r>
-                        <a:rPr lang="pt-BR" dirty="0" smtClean="0"/>
+                        <a:rPr lang="pt-BR" dirty="0"/>
                         <a:t>0.7</a:t>
                       </a:r>
-                      <a:endParaRPr lang="pt-BR" dirty="0"/>
                     </a:p>
                   </a:txBody>
                   <a:tcPr/>
@@ -9029,10 +9125,9 @@
                     <a:p>
                       <a:pPr algn="ctr"/>
                       <a:r>
-                        <a:rPr lang="pt-BR" dirty="0" smtClean="0"/>
+                        <a:rPr lang="pt-BR" dirty="0"/>
                         <a:t>0.7</a:t>
                       </a:r>
-                      <a:endParaRPr lang="pt-BR" dirty="0"/>
                     </a:p>
                   </a:txBody>
                   <a:tcPr/>
@@ -9044,14 +9139,18 @@
                     <a:p>
                       <a:pPr algn="ctr"/>
                       <a:r>
-                        <a:rPr lang="pt-BR" dirty="0" smtClean="0"/>
+                        <a:rPr lang="pt-BR" dirty="0"/>
                         <a:t>0.7</a:t>
                       </a:r>
-                      <a:endParaRPr lang="pt-BR" dirty="0"/>
-                    </a:p>
-                  </a:txBody>
-                  <a:tcPr/>
-                </a:tc>
+                    </a:p>
+                  </a:txBody>
+                  <a:tcPr/>
+                </a:tc>
+                <a:extLst>
+                  <a:ext uri="{0D108BD9-81ED-4DB2-BD59-A6C34878D82A}">
+                    <a16:rowId xmlns:a16="http://schemas.microsoft.com/office/drawing/2014/main" val="10002"/>
+                  </a:ext>
+                </a:extLst>
               </a:tr>
               <a:tr h="370840">
                 <a:tc>
@@ -9061,10 +9160,9 @@
                     <a:p>
                       <a:pPr algn="ctr"/>
                       <a:r>
-                        <a:rPr lang="pt-BR" dirty="0" smtClean="0"/>
+                        <a:rPr lang="pt-BR" dirty="0"/>
                         <a:t>Probabilidade de Mutação</a:t>
                       </a:r>
-                      <a:endParaRPr lang="pt-BR" dirty="0"/>
                     </a:p>
                   </a:txBody>
                   <a:tcPr/>
@@ -9076,10 +9174,9 @@
                     <a:p>
                       <a:pPr algn="ctr"/>
                       <a:r>
-                        <a:rPr lang="pt-BR" dirty="0" smtClean="0"/>
+                        <a:rPr lang="pt-BR" dirty="0"/>
                         <a:t>0.03</a:t>
                       </a:r>
-                      <a:endParaRPr lang="pt-BR" dirty="0"/>
                     </a:p>
                   </a:txBody>
                   <a:tcPr/>
@@ -9091,10 +9188,9 @@
                     <a:p>
                       <a:pPr algn="ctr"/>
                       <a:r>
-                        <a:rPr lang="pt-BR" dirty="0" smtClean="0"/>
+                        <a:rPr lang="pt-BR" dirty="0"/>
                         <a:t>0.03</a:t>
                       </a:r>
-                      <a:endParaRPr lang="pt-BR" dirty="0"/>
                     </a:p>
                   </a:txBody>
                   <a:tcPr/>
@@ -9106,10 +9202,9 @@
                     <a:p>
                       <a:pPr algn="ctr"/>
                       <a:r>
-                        <a:rPr lang="pt-BR" dirty="0" smtClean="0"/>
+                        <a:rPr lang="pt-BR" dirty="0"/>
                         <a:t>0.03</a:t>
                       </a:r>
-                      <a:endParaRPr lang="pt-BR" dirty="0"/>
                     </a:p>
                   </a:txBody>
                   <a:tcPr/>
@@ -9121,10 +9216,9 @@
                     <a:p>
                       <a:pPr algn="ctr"/>
                       <a:r>
-                        <a:rPr lang="pt-BR" dirty="0" smtClean="0"/>
+                        <a:rPr lang="pt-BR" dirty="0"/>
                         <a:t>0.03</a:t>
                       </a:r>
-                      <a:endParaRPr lang="pt-BR" dirty="0"/>
                     </a:p>
                   </a:txBody>
                   <a:tcPr/>
@@ -9136,10 +9230,9 @@
                     <a:p>
                       <a:pPr algn="ctr"/>
                       <a:r>
-                        <a:rPr lang="pt-BR" dirty="0" smtClean="0"/>
+                        <a:rPr lang="pt-BR" dirty="0"/>
                         <a:t>0.03</a:t>
                       </a:r>
-                      <a:endParaRPr lang="pt-BR" dirty="0"/>
                     </a:p>
                   </a:txBody>
                   <a:tcPr/>
@@ -9151,14 +9244,18 @@
                     <a:p>
                       <a:pPr algn="ctr"/>
                       <a:r>
-                        <a:rPr lang="pt-BR" dirty="0" smtClean="0"/>
+                        <a:rPr lang="pt-BR" dirty="0"/>
                         <a:t>0.03</a:t>
                       </a:r>
-                      <a:endParaRPr lang="pt-BR" dirty="0"/>
-                    </a:p>
-                  </a:txBody>
-                  <a:tcPr/>
-                </a:tc>
+                    </a:p>
+                  </a:txBody>
+                  <a:tcPr/>
+                </a:tc>
+                <a:extLst>
+                  <a:ext uri="{0D108BD9-81ED-4DB2-BD59-A6C34878D82A}">
+                    <a16:rowId xmlns:a16="http://schemas.microsoft.com/office/drawing/2014/main" val="10003"/>
+                  </a:ext>
+                </a:extLst>
               </a:tr>
               <a:tr h="370840">
                 <a:tc>
@@ -9168,10 +9265,9 @@
                     <a:p>
                       <a:pPr algn="ctr"/>
                       <a:r>
-                        <a:rPr lang="pt-BR" dirty="0" smtClean="0"/>
+                        <a:rPr lang="pt-BR" dirty="0"/>
                         <a:t>Desvio-Padrão</a:t>
                       </a:r>
-                      <a:endParaRPr lang="pt-BR" dirty="0"/>
                     </a:p>
                   </a:txBody>
                   <a:tcPr/>
@@ -9183,10 +9279,9 @@
                     <a:p>
                       <a:pPr algn="ctr"/>
                       <a:r>
-                        <a:rPr lang="pt-BR" dirty="0" smtClean="0"/>
+                        <a:rPr lang="pt-BR" dirty="0"/>
                         <a:t>0.01</a:t>
                       </a:r>
-                      <a:endParaRPr lang="pt-BR" dirty="0"/>
                     </a:p>
                   </a:txBody>
                   <a:tcPr/>
@@ -9198,10 +9293,9 @@
                     <a:p>
                       <a:pPr algn="ctr"/>
                       <a:r>
-                        <a:rPr lang="pt-BR" dirty="0" smtClean="0"/>
+                        <a:rPr lang="pt-BR" dirty="0"/>
                         <a:t>0.01</a:t>
                       </a:r>
-                      <a:endParaRPr lang="pt-BR" dirty="0"/>
                     </a:p>
                   </a:txBody>
                   <a:tcPr/>
@@ -9213,10 +9307,9 @@
                     <a:p>
                       <a:pPr algn="ctr"/>
                       <a:r>
-                        <a:rPr lang="pt-BR" dirty="0" smtClean="0"/>
+                        <a:rPr lang="pt-BR" dirty="0"/>
                         <a:t>0.01</a:t>
                       </a:r>
-                      <a:endParaRPr lang="pt-BR" dirty="0"/>
                     </a:p>
                   </a:txBody>
                   <a:tcPr/>
@@ -9228,10 +9321,9 @@
                     <a:p>
                       <a:pPr algn="ctr"/>
                       <a:r>
-                        <a:rPr lang="pt-BR" dirty="0" smtClean="0"/>
+                        <a:rPr lang="pt-BR" dirty="0"/>
                         <a:t>0.01</a:t>
                       </a:r>
-                      <a:endParaRPr lang="pt-BR" dirty="0"/>
                     </a:p>
                   </a:txBody>
                   <a:tcPr/>
@@ -9243,10 +9335,9 @@
                     <a:p>
                       <a:pPr algn="ctr"/>
                       <a:r>
-                        <a:rPr lang="pt-BR" dirty="0" smtClean="0"/>
+                        <a:rPr lang="pt-BR" dirty="0"/>
                         <a:t>0.01</a:t>
                       </a:r>
-                      <a:endParaRPr lang="pt-BR" dirty="0"/>
                     </a:p>
                   </a:txBody>
                   <a:tcPr/>
@@ -9258,14 +9349,18 @@
                     <a:p>
                       <a:pPr algn="ctr"/>
                       <a:r>
-                        <a:rPr lang="pt-BR" dirty="0" smtClean="0"/>
+                        <a:rPr lang="pt-BR" dirty="0"/>
                         <a:t>0.01</a:t>
                       </a:r>
-                      <a:endParaRPr lang="pt-BR" dirty="0"/>
-                    </a:p>
-                  </a:txBody>
-                  <a:tcPr/>
-                </a:tc>
+                    </a:p>
+                  </a:txBody>
+                  <a:tcPr/>
+                </a:tc>
+                <a:extLst>
+                  <a:ext uri="{0D108BD9-81ED-4DB2-BD59-A6C34878D82A}">
+                    <a16:rowId xmlns:a16="http://schemas.microsoft.com/office/drawing/2014/main" val="10004"/>
+                  </a:ext>
+                </a:extLst>
               </a:tr>
               <a:tr h="370840">
                 <a:tc>
@@ -9275,10 +9370,9 @@
                     <a:p>
                       <a:pPr algn="ctr"/>
                       <a:r>
-                        <a:rPr lang="pt-BR" dirty="0" smtClean="0"/>
+                        <a:rPr lang="pt-BR" dirty="0"/>
                         <a:t>Número de Gerações</a:t>
                       </a:r>
-                      <a:endParaRPr lang="pt-BR" dirty="0"/>
                     </a:p>
                   </a:txBody>
                   <a:tcPr/>
@@ -9290,10 +9384,9 @@
                     <a:p>
                       <a:pPr algn="ctr"/>
                       <a:r>
-                        <a:rPr lang="pt-BR" dirty="0" smtClean="0"/>
+                        <a:rPr lang="pt-BR" dirty="0"/>
                         <a:t>3000</a:t>
                       </a:r>
-                      <a:endParaRPr lang="pt-BR" dirty="0"/>
                     </a:p>
                   </a:txBody>
                   <a:tcPr/>
@@ -9305,10 +9398,9 @@
                     <a:p>
                       <a:pPr algn="ctr"/>
                       <a:r>
-                        <a:rPr lang="pt-BR" dirty="0" smtClean="0"/>
+                        <a:rPr lang="pt-BR" dirty="0"/>
                         <a:t>4000</a:t>
                       </a:r>
-                      <a:endParaRPr lang="pt-BR" dirty="0"/>
                     </a:p>
                   </a:txBody>
                   <a:tcPr/>
@@ -9320,10 +9412,9 @@
                     <a:p>
                       <a:pPr algn="ctr"/>
                       <a:r>
-                        <a:rPr lang="pt-BR" dirty="0" smtClean="0"/>
+                        <a:rPr lang="pt-BR" dirty="0"/>
                         <a:t>6000</a:t>
                       </a:r>
-                      <a:endParaRPr lang="pt-BR" dirty="0"/>
                     </a:p>
                   </a:txBody>
                   <a:tcPr/>
@@ -9335,10 +9426,9 @@
                     <a:p>
                       <a:pPr algn="ctr"/>
                       <a:r>
-                        <a:rPr lang="pt-BR" dirty="0" smtClean="0"/>
+                        <a:rPr lang="pt-BR" dirty="0"/>
                         <a:t>3000</a:t>
                       </a:r>
-                      <a:endParaRPr lang="pt-BR" dirty="0"/>
                     </a:p>
                   </a:txBody>
                   <a:tcPr/>
@@ -9350,10 +9440,9 @@
                     <a:p>
                       <a:pPr algn="ctr"/>
                       <a:r>
-                        <a:rPr lang="pt-BR" dirty="0" smtClean="0"/>
+                        <a:rPr lang="pt-BR" dirty="0"/>
                         <a:t>4000</a:t>
                       </a:r>
-                      <a:endParaRPr lang="pt-BR" dirty="0"/>
                     </a:p>
                   </a:txBody>
                   <a:tcPr/>
@@ -9365,14 +9454,18 @@
                     <a:p>
                       <a:pPr algn="ctr"/>
                       <a:r>
-                        <a:rPr lang="pt-BR" dirty="0" smtClean="0"/>
+                        <a:rPr lang="pt-BR" dirty="0"/>
                         <a:t>6000</a:t>
                       </a:r>
-                      <a:endParaRPr lang="pt-BR" dirty="0"/>
-                    </a:p>
-                  </a:txBody>
-                  <a:tcPr/>
-                </a:tc>
+                    </a:p>
+                  </a:txBody>
+                  <a:tcPr/>
+                </a:tc>
+                <a:extLst>
+                  <a:ext uri="{0D108BD9-81ED-4DB2-BD59-A6C34878D82A}">
+                    <a16:rowId xmlns:a16="http://schemas.microsoft.com/office/drawing/2014/main" val="10005"/>
+                  </a:ext>
+                </a:extLst>
               </a:tr>
             </a:tbl>
           </a:graphicData>
@@ -9401,54 +9494,53 @@
           <a:lstStyle/>
           <a:p>
             <a:r>
-              <a:rPr lang="pt-BR" b="1" dirty="0" smtClean="0"/>
+              <a:rPr lang="pt-BR" b="1" dirty="0"/>
               <a:t>Seleção: </a:t>
             </a:r>
             <a:r>
-              <a:rPr lang="pt-BR" dirty="0" smtClean="0"/>
+              <a:rPr lang="pt-BR" dirty="0"/>
               <a:t>Torneio</a:t>
             </a:r>
           </a:p>
           <a:p>
             <a:r>
-              <a:rPr lang="pt-BR" b="1" dirty="0" smtClean="0"/>
+              <a:rPr lang="pt-BR" b="1" dirty="0"/>
               <a:t>Cruzamento:</a:t>
             </a:r>
             <a:r>
-              <a:rPr lang="pt-BR" dirty="0" smtClean="0"/>
+              <a:rPr lang="pt-BR" dirty="0"/>
               <a:t> Aritmético</a:t>
             </a:r>
           </a:p>
           <a:p>
             <a:r>
-              <a:rPr lang="pt-BR" b="1" dirty="0" smtClean="0"/>
+              <a:rPr lang="pt-BR" b="1" dirty="0"/>
               <a:t>Mutação:</a:t>
             </a:r>
             <a:r>
-              <a:rPr lang="pt-BR" dirty="0" smtClean="0"/>
+              <a:rPr lang="pt-BR" dirty="0"/>
               <a:t> Gaussiana</a:t>
             </a:r>
           </a:p>
           <a:p>
             <a:r>
-              <a:rPr lang="pt-BR" b="1" dirty="0" smtClean="0"/>
+              <a:rPr lang="pt-BR" b="1" dirty="0"/>
               <a:t>Troca de População:</a:t>
             </a:r>
             <a:r>
-              <a:rPr lang="pt-BR" dirty="0" smtClean="0"/>
+              <a:rPr lang="pt-BR" dirty="0"/>
               <a:t> Geracional</a:t>
             </a:r>
           </a:p>
           <a:p>
             <a:r>
-              <a:rPr lang="pt-BR" b="1" dirty="0" smtClean="0"/>
+              <a:rPr lang="pt-BR" b="1" dirty="0"/>
               <a:t>Elitismo:</a:t>
             </a:r>
             <a:r>
-              <a:rPr lang="pt-BR" dirty="0" smtClean="0"/>
+              <a:rPr lang="pt-BR" dirty="0"/>
               <a:t> Sim</a:t>
             </a:r>
-            <a:endParaRPr lang="pt-BR" dirty="0"/>
           </a:p>
         </p:txBody>
       </p:sp>
@@ -9457,13 +9549,6 @@
   <p:clrMapOvr>
     <a:masterClrMapping/>
   </p:clrMapOvr>
-  <p:timing>
-    <p:tnLst>
-      <p:par>
-        <p:cTn id="1" dur="indefinite" restart="never" nodeType="tmRoot"/>
-      </p:par>
-    </p:tnLst>
-  </p:timing>
 </p:sld>
 </file>
 
@@ -9549,7 +9634,13 @@
                 <a:tableStyleId>{5C22544A-7EE6-4342-B048-85BDC9FD1C3A}</a:tableStyleId>
               </a:tblPr>
               <a:tblGrid>
-                <a:gridCol w="10515600"/>
+                <a:gridCol w="10515600">
+                  <a:extLst>
+                    <a:ext uri="{9D8B030D-6E8A-4147-A177-3AD203B41FA5}">
+                      <a16:colId xmlns:a16="http://schemas.microsoft.com/office/drawing/2014/main" val="20000"/>
+                    </a:ext>
+                  </a:extLst>
+                </a:gridCol>
               </a:tblGrid>
               <a:tr h="370840">
                 <a:tc>
@@ -9559,14 +9650,18 @@
                     <a:p>
                       <a:pPr algn="ctr"/>
                       <a:r>
-                        <a:rPr lang="pt-BR" dirty="0" smtClean="0"/>
+                        <a:rPr lang="pt-BR" dirty="0"/>
                         <a:t>Soluções Encontradas para 10 caracteres da Palavra Alvo (AG, População 50)</a:t>
                       </a:r>
-                      <a:endParaRPr lang="pt-BR" dirty="0"/>
-                    </a:p>
-                  </a:txBody>
-                  <a:tcPr/>
-                </a:tc>
+                    </a:p>
+                  </a:txBody>
+                  <a:tcPr/>
+                </a:tc>
+                <a:extLst>
+                  <a:ext uri="{0D108BD9-81ED-4DB2-BD59-A6C34878D82A}">
+                    <a16:rowId xmlns:a16="http://schemas.microsoft.com/office/drawing/2014/main" val="10000"/>
+                  </a:ext>
+                </a:extLst>
               </a:tr>
               <a:tr h="370840">
                 <a:tc>
@@ -9576,14 +9671,18 @@
                     <a:p>
                       <a:pPr algn="ctr"/>
                       <a:r>
-                        <a:rPr lang="pt-BR" dirty="0" smtClean="0"/>
+                        <a:rPr lang="pt-BR" dirty="0"/>
                         <a:t>52.547, 72.15, 53.694, 57.771, 115.88, 105.59, 75.368, 126.02, 52.756, 85.1</a:t>
                       </a:r>
-                      <a:endParaRPr lang="pt-BR" dirty="0"/>
-                    </a:p>
-                  </a:txBody>
-                  <a:tcPr/>
-                </a:tc>
+                    </a:p>
+                  </a:txBody>
+                  <a:tcPr/>
+                </a:tc>
+                <a:extLst>
+                  <a:ext uri="{0D108BD9-81ED-4DB2-BD59-A6C34878D82A}">
+                    <a16:rowId xmlns:a16="http://schemas.microsoft.com/office/drawing/2014/main" val="10001"/>
+                  </a:ext>
+                </a:extLst>
               </a:tr>
               <a:tr h="370840">
                 <a:tc>
@@ -9593,14 +9692,18 @@
                     <a:p>
                       <a:pPr algn="ctr"/>
                       <a:r>
-                        <a:rPr lang="pt-BR" dirty="0" smtClean="0"/>
+                        <a:rPr lang="pt-BR" dirty="0"/>
                         <a:t>52.547, 72.15, 53.694, 57.771, 115.88, 105.59, 75.368, 126.02, 52.756, 85.1</a:t>
                       </a:r>
-                      <a:endParaRPr lang="pt-BR" dirty="0"/>
-                    </a:p>
-                  </a:txBody>
-                  <a:tcPr/>
-                </a:tc>
+                    </a:p>
+                  </a:txBody>
+                  <a:tcPr/>
+                </a:tc>
+                <a:extLst>
+                  <a:ext uri="{0D108BD9-81ED-4DB2-BD59-A6C34878D82A}">
+                    <a16:rowId xmlns:a16="http://schemas.microsoft.com/office/drawing/2014/main" val="10002"/>
+                  </a:ext>
+                </a:extLst>
               </a:tr>
               <a:tr h="370840">
                 <a:tc>
@@ -9610,14 +9713,18 @@
                     <a:p>
                       <a:pPr algn="ctr"/>
                       <a:r>
-                        <a:rPr lang="pt-BR" dirty="0" smtClean="0"/>
+                        <a:rPr lang="pt-BR" dirty="0"/>
                         <a:t>52.547, 72.15, 53.694, 57.771, 115.88, 105.59, 75.368, 126.02, 52.756, 85.1</a:t>
                       </a:r>
-                      <a:endParaRPr lang="pt-BR" dirty="0"/>
-                    </a:p>
-                  </a:txBody>
-                  <a:tcPr/>
-                </a:tc>
+                    </a:p>
+                  </a:txBody>
+                  <a:tcPr/>
+                </a:tc>
+                <a:extLst>
+                  <a:ext uri="{0D108BD9-81ED-4DB2-BD59-A6C34878D82A}">
+                    <a16:rowId xmlns:a16="http://schemas.microsoft.com/office/drawing/2014/main" val="10003"/>
+                  </a:ext>
+                </a:extLst>
               </a:tr>
               <a:tr h="370840">
                 <a:tc>
@@ -9627,14 +9734,18 @@
                     <a:p>
                       <a:pPr algn="ctr"/>
                       <a:r>
-                        <a:rPr lang="pt-BR" dirty="0" smtClean="0"/>
+                        <a:rPr lang="pt-BR" dirty="0"/>
                         <a:t>52.547, 72.15, 53.694, 57.771, 115.88, 105.59, 75.368, 126.02, 52.756, 85.1</a:t>
                       </a:r>
-                      <a:endParaRPr lang="pt-BR" dirty="0"/>
-                    </a:p>
-                  </a:txBody>
-                  <a:tcPr/>
-                </a:tc>
+                    </a:p>
+                  </a:txBody>
+                  <a:tcPr/>
+                </a:tc>
+                <a:extLst>
+                  <a:ext uri="{0D108BD9-81ED-4DB2-BD59-A6C34878D82A}">
+                    <a16:rowId xmlns:a16="http://schemas.microsoft.com/office/drawing/2014/main" val="10004"/>
+                  </a:ext>
+                </a:extLst>
               </a:tr>
               <a:tr h="370840">
                 <a:tc>
@@ -9644,14 +9755,18 @@
                     <a:p>
                       <a:pPr algn="ctr"/>
                       <a:r>
-                        <a:rPr lang="pt-BR" dirty="0" smtClean="0"/>
+                        <a:rPr lang="pt-BR" dirty="0"/>
                         <a:t>52.547, 72.15, 53.694, 57.771, 115.88, 105.59, 75.368, 126.02, 52.756, 85.1</a:t>
                       </a:r>
-                      <a:endParaRPr lang="pt-BR" dirty="0"/>
-                    </a:p>
-                  </a:txBody>
-                  <a:tcPr/>
-                </a:tc>
+                    </a:p>
+                  </a:txBody>
+                  <a:tcPr/>
+                </a:tc>
+                <a:extLst>
+                  <a:ext uri="{0D108BD9-81ED-4DB2-BD59-A6C34878D82A}">
+                    <a16:rowId xmlns:a16="http://schemas.microsoft.com/office/drawing/2014/main" val="10005"/>
+                  </a:ext>
+                </a:extLst>
               </a:tr>
             </a:tbl>
           </a:graphicData>
@@ -9662,13 +9777,6 @@
   <p:clrMapOvr>
     <a:masterClrMapping/>
   </p:clrMapOvr>
-  <p:timing>
-    <p:tnLst>
-      <p:par>
-        <p:cTn id="1" dur="indefinite" restart="never" nodeType="tmRoot"/>
-      </p:par>
-    </p:tnLst>
-  </p:timing>
 </p:sld>
 </file>
 

</xml_diff>